<commit_message>
Correção do módulo III
</commit_message>
<xml_diff>
--- a/Módulo 03 - Widgets no Flutter/Módulo III - Widgets no Flutter.pptx
+++ b/Módulo 03 - Widgets no Flutter/Módulo III - Widgets no Flutter.pptx
@@ -158,7 +158,7 @@
 <file path=ppt/revisionInfo.xml><?xml version="1.0" encoding="utf-8"?>
 <p1510:revInfo xmlns:a="http://schemas.openxmlformats.org/drawingml/2006/main" xmlns:r="http://schemas.openxmlformats.org/officeDocument/2006/relationships" xmlns:p1510="http://schemas.microsoft.com/office/powerpoint/2015/10/main">
   <p1510:revLst>
-    <p1510:client id="{C565D1DC-BFEB-1357-C8AD-BC24CEEDD2F5}" v="264" dt="2024-11-18T23:30:03.856"/>
+    <p1510:client id="{0401D132-AE55-5313-0F11-E0DFA60F4A28}" v="394" dt="2024-12-08T13:12:27.703"/>
   </p1510:revLst>
 </p1510:revInfo>
 </file>
@@ -343,7 +343,7 @@
             <a:fld id="{1D8BD707-D9CF-40AE-B4C6-C98DA3205C09}" type="datetimeFigureOut">
               <a:rPr lang="en-US" smtClean="0"/>
               <a:pPr/>
-              <a:t>11/18/2024</a:t>
+              <a:t>12/8/2024</a:t>
             </a:fld>
             <a:endParaRPr lang="en-US"/>
           </a:p>
@@ -508,7 +508,7 @@
             <a:fld id="{1D8BD707-D9CF-40AE-B4C6-C98DA3205C09}" type="datetimeFigureOut">
               <a:rPr lang="en-US" smtClean="0"/>
               <a:pPr/>
-              <a:t>11/18/2024</a:t>
+              <a:t>12/8/2024</a:t>
             </a:fld>
             <a:endParaRPr lang="en-US"/>
           </a:p>
@@ -683,7 +683,7 @@
             <a:fld id="{1D8BD707-D9CF-40AE-B4C6-C98DA3205C09}" type="datetimeFigureOut">
               <a:rPr lang="en-US" smtClean="0"/>
               <a:pPr/>
-              <a:t>11/18/2024</a:t>
+              <a:t>12/8/2024</a:t>
             </a:fld>
             <a:endParaRPr lang="en-US"/>
           </a:p>
@@ -848,7 +848,7 @@
             <a:fld id="{1D8BD707-D9CF-40AE-B4C6-C98DA3205C09}" type="datetimeFigureOut">
               <a:rPr lang="en-US" smtClean="0"/>
               <a:pPr/>
-              <a:t>11/18/2024</a:t>
+              <a:t>12/8/2024</a:t>
             </a:fld>
             <a:endParaRPr lang="en-US"/>
           </a:p>
@@ -1090,7 +1090,7 @@
             <a:fld id="{1D8BD707-D9CF-40AE-B4C6-C98DA3205C09}" type="datetimeFigureOut">
               <a:rPr lang="en-US" smtClean="0"/>
               <a:pPr/>
-              <a:t>11/18/2024</a:t>
+              <a:t>12/8/2024</a:t>
             </a:fld>
             <a:endParaRPr lang="en-US"/>
           </a:p>
@@ -1372,7 +1372,7 @@
             <a:fld id="{1D8BD707-D9CF-40AE-B4C6-C98DA3205C09}" type="datetimeFigureOut">
               <a:rPr lang="en-US" smtClean="0"/>
               <a:pPr/>
-              <a:t>11/18/2024</a:t>
+              <a:t>12/8/2024</a:t>
             </a:fld>
             <a:endParaRPr lang="en-US"/>
           </a:p>
@@ -1788,7 +1788,7 @@
             <a:fld id="{1D8BD707-D9CF-40AE-B4C6-C98DA3205C09}" type="datetimeFigureOut">
               <a:rPr lang="en-US" smtClean="0"/>
               <a:pPr/>
-              <a:t>11/18/2024</a:t>
+              <a:t>12/8/2024</a:t>
             </a:fld>
             <a:endParaRPr lang="en-US"/>
           </a:p>
@@ -1902,7 +1902,7 @@
             <a:fld id="{1D8BD707-D9CF-40AE-B4C6-C98DA3205C09}" type="datetimeFigureOut">
               <a:rPr lang="en-US" smtClean="0"/>
               <a:pPr/>
-              <a:t>11/18/2024</a:t>
+              <a:t>12/8/2024</a:t>
             </a:fld>
             <a:endParaRPr lang="en-US"/>
           </a:p>
@@ -1994,7 +1994,7 @@
             <a:fld id="{1D8BD707-D9CF-40AE-B4C6-C98DA3205C09}" type="datetimeFigureOut">
               <a:rPr lang="en-US" smtClean="0"/>
               <a:pPr/>
-              <a:t>11/18/2024</a:t>
+              <a:t>12/8/2024</a:t>
             </a:fld>
             <a:endParaRPr lang="en-US"/>
           </a:p>
@@ -2266,7 +2266,7 @@
             <a:fld id="{1D8BD707-D9CF-40AE-B4C6-C98DA3205C09}" type="datetimeFigureOut">
               <a:rPr lang="en-US" smtClean="0"/>
               <a:pPr/>
-              <a:t>11/18/2024</a:t>
+              <a:t>12/8/2024</a:t>
             </a:fld>
             <a:endParaRPr lang="en-US"/>
           </a:p>
@@ -2515,7 +2515,7 @@
             <a:fld id="{1D8BD707-D9CF-40AE-B4C6-C98DA3205C09}" type="datetimeFigureOut">
               <a:rPr lang="en-US" smtClean="0"/>
               <a:pPr/>
-              <a:t>11/18/2024</a:t>
+              <a:t>12/8/2024</a:t>
             </a:fld>
             <a:endParaRPr lang="en-US"/>
           </a:p>
@@ -2723,7 +2723,7 @@
             <a:fld id="{1D8BD707-D9CF-40AE-B4C6-C98DA3205C09}" type="datetimeFigureOut">
               <a:rPr lang="en-US" smtClean="0"/>
               <a:pPr/>
-              <a:t>11/18/2024</a:t>
+              <a:t>12/8/2024</a:t>
             </a:fld>
             <a:endParaRPr lang="en-US"/>
           </a:p>
@@ -5656,52 +5656,6 @@
       </p:grpSp>
       <p:sp>
         <p:nvSpPr>
-          <p:cNvPr id="4" name="Freeform 4"/>
-          <p:cNvSpPr/>
-          <p:nvPr/>
-        </p:nvSpPr>
-        <p:spPr>
-          <a:xfrm>
-            <a:off x="9738947" y="2559910"/>
-            <a:ext cx="8330780" cy="5489426"/>
-          </a:xfrm>
-          <a:custGeom>
-            <a:avLst/>
-            <a:gdLst/>
-            <a:ahLst/>
-            <a:cxnLst/>
-            <a:rect l="l" t="t" r="r" b="b"/>
-            <a:pathLst>
-              <a:path w="8330780" h="5489426">
-                <a:moveTo>
-                  <a:pt x="0" y="0"/>
-                </a:moveTo>
-                <a:lnTo>
-                  <a:pt x="8330779" y="0"/>
-                </a:lnTo>
-                <a:lnTo>
-                  <a:pt x="8330779" y="5489426"/>
-                </a:lnTo>
-                <a:lnTo>
-                  <a:pt x="0" y="5489426"/>
-                </a:lnTo>
-                <a:lnTo>
-                  <a:pt x="0" y="0"/>
-                </a:lnTo>
-                <a:close/>
-              </a:path>
-            </a:pathLst>
-          </a:custGeom>
-          <a:blipFill>
-            <a:blip r:embed="rId2"/>
-            <a:stretch>
-              <a:fillRect t="-22125" r="-51280"/>
-            </a:stretch>
-          </a:blipFill>
-        </p:spPr>
-      </p:sp>
-      <p:sp>
-        <p:nvSpPr>
           <p:cNvPr id="5" name="TextBox 5"/>
           <p:cNvSpPr txBox="1"/>
           <p:nvPr/>
@@ -5746,809 +5700,8 @@
         </p:nvSpPr>
         <p:spPr>
           <a:xfrm>
-            <a:off x="301812" y="1569289"/>
-            <a:ext cx="9674163" cy="8617744"/>
-          </a:xfrm>
-          <a:prstGeom prst="rect">
-            <a:avLst/>
-          </a:prstGeom>
-        </p:spPr>
-        <p:txBody>
-          <a:bodyPr lIns="0" tIns="0" rIns="0" bIns="0" rtlCol="0" anchor="t">
-            <a:spAutoFit/>
-          </a:bodyPr>
-          <a:lstStyle/>
-          <a:p>
-            <a:pPr marL="733425" lvl="1" indent="-367030" algn="just">
-              <a:lnSpc>
-                <a:spcPts val="4759"/>
-              </a:lnSpc>
-              <a:buFont typeface="Arial"/>
-              <a:buChar char="•"/>
-            </a:pPr>
-            <a:r>
-              <a:rPr lang="en-US" sz="4000" spc="339" dirty="0" err="1">
-                <a:solidFill>
-                  <a:srgbClr val="000000"/>
-                </a:solidFill>
-                <a:latin typeface="Lato"/>
-              </a:rPr>
-              <a:t>Os</a:t>
-            </a:r>
-            <a:r>
-              <a:rPr lang="en-US" sz="4000" spc="339" dirty="0">
-                <a:solidFill>
-                  <a:srgbClr val="000000"/>
-                </a:solidFill>
-                <a:latin typeface="Lato"/>
-              </a:rPr>
-              <a:t> Widgets que </a:t>
-            </a:r>
-            <a:r>
-              <a:rPr lang="en-US" sz="4000" spc="339" dirty="0" err="1">
-                <a:solidFill>
-                  <a:srgbClr val="000000"/>
-                </a:solidFill>
-                <a:latin typeface="Lato"/>
-              </a:rPr>
-              <a:t>possuem</a:t>
-            </a:r>
-            <a:r>
-              <a:rPr lang="en-US" sz="4000" spc="339" dirty="0">
-                <a:solidFill>
-                  <a:srgbClr val="000000"/>
-                </a:solidFill>
-                <a:latin typeface="Lato"/>
-              </a:rPr>
-              <a:t> </a:t>
-            </a:r>
-            <a:r>
-              <a:rPr lang="en-US" sz="4000" spc="339" dirty="0" err="1">
-                <a:solidFill>
-                  <a:srgbClr val="000000"/>
-                </a:solidFill>
-                <a:latin typeface="Lato"/>
-              </a:rPr>
-              <a:t>estado</a:t>
-            </a:r>
-            <a:r>
-              <a:rPr lang="en-US" sz="4000" spc="339" dirty="0">
-                <a:solidFill>
-                  <a:srgbClr val="000000"/>
-                </a:solidFill>
-                <a:latin typeface="Lato"/>
-              </a:rPr>
-              <a:t> </a:t>
-            </a:r>
-            <a:r>
-              <a:rPr lang="en-US" sz="4000" spc="339" dirty="0" err="1">
-                <a:solidFill>
-                  <a:srgbClr val="000000"/>
-                </a:solidFill>
-                <a:latin typeface="Lato"/>
-              </a:rPr>
-              <a:t>são</a:t>
-            </a:r>
-            <a:r>
-              <a:rPr lang="en-US" sz="4000" spc="339" dirty="0">
-                <a:solidFill>
-                  <a:srgbClr val="000000"/>
-                </a:solidFill>
-                <a:latin typeface="Lato"/>
-              </a:rPr>
-              <a:t> </a:t>
-            </a:r>
-            <a:r>
-              <a:rPr lang="en-US" sz="4000" spc="339" dirty="0" err="1">
-                <a:solidFill>
-                  <a:srgbClr val="000000"/>
-                </a:solidFill>
-                <a:latin typeface="Lato"/>
-              </a:rPr>
-              <a:t>denominados</a:t>
-            </a:r>
-            <a:r>
-              <a:rPr lang="en-US" sz="4000" spc="339" dirty="0">
-                <a:solidFill>
-                  <a:srgbClr val="000000"/>
-                </a:solidFill>
-                <a:latin typeface="Lato"/>
-              </a:rPr>
-              <a:t> de Stateful Widget;</a:t>
-            </a:r>
-            <a:endParaRPr lang="en-US" sz="4000" spc="339" dirty="0">
-              <a:solidFill>
-                <a:srgbClr val="000000"/>
-              </a:solidFill>
-              <a:latin typeface="Lato"/>
-              <a:ea typeface="Lato"/>
-              <a:cs typeface="Lato"/>
-            </a:endParaRPr>
-          </a:p>
-          <a:p>
-            <a:pPr marL="733425" lvl="1" indent="-367030" algn="just">
-              <a:lnSpc>
-                <a:spcPts val="4759"/>
-              </a:lnSpc>
-              <a:buFont typeface="Arial"/>
-              <a:buChar char="•"/>
-            </a:pPr>
-            <a:r>
-              <a:rPr lang="en-US" sz="4000" spc="339" dirty="0">
-                <a:solidFill>
-                  <a:srgbClr val="000000"/>
-                </a:solidFill>
-                <a:latin typeface="Lato"/>
-              </a:rPr>
-              <a:t>Durante a </a:t>
-            </a:r>
-            <a:r>
-              <a:rPr lang="en-US" sz="4000" spc="339" dirty="0" err="1">
-                <a:solidFill>
-                  <a:srgbClr val="000000"/>
-                </a:solidFill>
-                <a:latin typeface="Lato"/>
-              </a:rPr>
-              <a:t>execução</a:t>
-            </a:r>
-            <a:r>
-              <a:rPr lang="en-US" sz="4000" spc="339" dirty="0">
-                <a:solidFill>
-                  <a:srgbClr val="000000"/>
-                </a:solidFill>
-                <a:latin typeface="Lato"/>
-              </a:rPr>
-              <a:t> </a:t>
-            </a:r>
-            <a:r>
-              <a:rPr lang="en-US" sz="4000" spc="339" dirty="0" err="1">
-                <a:solidFill>
-                  <a:srgbClr val="000000"/>
-                </a:solidFill>
-                <a:latin typeface="Lato"/>
-              </a:rPr>
-              <a:t>pode</a:t>
-            </a:r>
-            <a:r>
-              <a:rPr lang="en-US" sz="4000" spc="339" dirty="0">
-                <a:solidFill>
-                  <a:srgbClr val="000000"/>
-                </a:solidFill>
-                <a:latin typeface="Lato"/>
-              </a:rPr>
-              <a:t> haver </a:t>
-            </a:r>
-            <a:r>
-              <a:rPr lang="en-US" sz="4000" spc="339" dirty="0" err="1">
-                <a:solidFill>
-                  <a:srgbClr val="000000"/>
-                </a:solidFill>
-                <a:latin typeface="Lato"/>
-              </a:rPr>
-              <a:t>alterações</a:t>
-            </a:r>
-            <a:r>
-              <a:rPr lang="en-US" sz="4000" spc="339" dirty="0">
-                <a:solidFill>
-                  <a:srgbClr val="000000"/>
-                </a:solidFill>
-                <a:latin typeface="Lato"/>
-              </a:rPr>
-              <a:t> </a:t>
-            </a:r>
-            <a:r>
-              <a:rPr lang="en-US" sz="4000" spc="339" dirty="0" err="1">
-                <a:solidFill>
-                  <a:srgbClr val="000000"/>
-                </a:solidFill>
-                <a:latin typeface="Lato"/>
-              </a:rPr>
-              <a:t>naquele</a:t>
-            </a:r>
-            <a:r>
-              <a:rPr lang="en-US" sz="4000" spc="339" dirty="0">
-                <a:solidFill>
-                  <a:srgbClr val="000000"/>
-                </a:solidFill>
-                <a:latin typeface="Lato"/>
-              </a:rPr>
-              <a:t> </a:t>
-            </a:r>
-            <a:r>
-              <a:rPr lang="en-US" sz="4000" spc="339" dirty="0" err="1">
-                <a:solidFill>
-                  <a:srgbClr val="000000"/>
-                </a:solidFill>
-                <a:latin typeface="Lato"/>
-              </a:rPr>
-              <a:t>componente</a:t>
-            </a:r>
-            <a:r>
-              <a:rPr lang="en-US" sz="4000" spc="339" dirty="0">
-                <a:solidFill>
-                  <a:srgbClr val="000000"/>
-                </a:solidFill>
-                <a:latin typeface="Lato"/>
-              </a:rPr>
-              <a:t> </a:t>
-            </a:r>
-            <a:r>
-              <a:rPr lang="en-US" sz="4000" spc="339" dirty="0" err="1">
-                <a:solidFill>
-                  <a:srgbClr val="000000"/>
-                </a:solidFill>
-                <a:latin typeface="Lato"/>
-              </a:rPr>
-              <a:t>sem</a:t>
-            </a:r>
-            <a:r>
-              <a:rPr lang="en-US" sz="4000" spc="339" dirty="0">
-                <a:solidFill>
-                  <a:srgbClr val="000000"/>
-                </a:solidFill>
-                <a:latin typeface="Lato"/>
-              </a:rPr>
-              <a:t> </a:t>
-            </a:r>
-            <a:r>
-              <a:rPr lang="en-US" sz="4000" spc="339" dirty="0" err="1">
-                <a:solidFill>
-                  <a:srgbClr val="000000"/>
-                </a:solidFill>
-                <a:latin typeface="Lato"/>
-              </a:rPr>
-              <a:t>precisar</a:t>
-            </a:r>
-            <a:r>
-              <a:rPr lang="en-US" sz="4000" spc="339" dirty="0">
-                <a:solidFill>
-                  <a:srgbClr val="000000"/>
-                </a:solidFill>
-                <a:latin typeface="Lato"/>
-              </a:rPr>
-              <a:t> </a:t>
-            </a:r>
-            <a:r>
-              <a:rPr lang="en-US" sz="4000" spc="339" dirty="0" err="1">
-                <a:solidFill>
-                  <a:srgbClr val="000000"/>
-                </a:solidFill>
-                <a:latin typeface="Lato"/>
-              </a:rPr>
-              <a:t>redirecionar</a:t>
-            </a:r>
-            <a:r>
-              <a:rPr lang="en-US" sz="4000" spc="339" dirty="0">
-                <a:solidFill>
-                  <a:srgbClr val="000000"/>
-                </a:solidFill>
-                <a:latin typeface="Lato"/>
-              </a:rPr>
-              <a:t> para </a:t>
-            </a:r>
-            <a:r>
-              <a:rPr lang="en-US" sz="4000" spc="339" dirty="0" err="1">
-                <a:solidFill>
-                  <a:srgbClr val="000000"/>
-                </a:solidFill>
-                <a:latin typeface="Lato"/>
-              </a:rPr>
-              <a:t>outra</a:t>
-            </a:r>
-            <a:r>
-              <a:rPr lang="en-US" sz="4000" spc="339" dirty="0">
-                <a:solidFill>
-                  <a:srgbClr val="000000"/>
-                </a:solidFill>
-                <a:latin typeface="Lato"/>
-              </a:rPr>
-              <a:t> </a:t>
-            </a:r>
-            <a:r>
-              <a:rPr lang="en-US" sz="4000" spc="339" dirty="0" err="1">
-                <a:solidFill>
-                  <a:srgbClr val="000000"/>
-                </a:solidFill>
-                <a:latin typeface="Lato"/>
-              </a:rPr>
-              <a:t>tela</a:t>
-            </a:r>
-            <a:r>
-              <a:rPr lang="en-US" sz="4000" spc="339" dirty="0">
-                <a:solidFill>
-                  <a:srgbClr val="000000"/>
-                </a:solidFill>
-                <a:latin typeface="Lato"/>
-              </a:rPr>
-              <a:t>;</a:t>
-            </a:r>
-            <a:endParaRPr lang="en-US" sz="4000" spc="339" dirty="0">
-              <a:solidFill>
-                <a:srgbClr val="000000"/>
-              </a:solidFill>
-              <a:latin typeface="Lato"/>
-              <a:ea typeface="Lato"/>
-              <a:cs typeface="Lato"/>
-            </a:endParaRPr>
-          </a:p>
-          <a:p>
-            <a:pPr marL="733425" lvl="1" indent="-367030" algn="just">
-              <a:lnSpc>
-                <a:spcPts val="4759"/>
-              </a:lnSpc>
-              <a:buFont typeface="Arial"/>
-              <a:buChar char="•"/>
-            </a:pPr>
-            <a:r>
-              <a:rPr lang="en-US" sz="4000" spc="339" dirty="0">
-                <a:solidFill>
-                  <a:srgbClr val="000000"/>
-                </a:solidFill>
-                <a:latin typeface="Lato"/>
-              </a:rPr>
-              <a:t>No </a:t>
-            </a:r>
-            <a:r>
-              <a:rPr lang="en-US" sz="4000" spc="339" dirty="0" err="1">
-                <a:solidFill>
-                  <a:srgbClr val="000000"/>
-                </a:solidFill>
-                <a:latin typeface="Lato"/>
-              </a:rPr>
-              <a:t>exemplo</a:t>
-            </a:r>
-            <a:r>
-              <a:rPr lang="en-US" sz="4000" spc="339" dirty="0">
-                <a:solidFill>
-                  <a:srgbClr val="000000"/>
-                </a:solidFill>
-                <a:latin typeface="Lato"/>
-              </a:rPr>
-              <a:t> </a:t>
-            </a:r>
-            <a:r>
-              <a:rPr lang="en-US" sz="4000" spc="339" dirty="0" err="1">
-                <a:solidFill>
-                  <a:srgbClr val="000000"/>
-                </a:solidFill>
-                <a:latin typeface="Lato"/>
-              </a:rPr>
-              <a:t>ao</a:t>
-            </a:r>
-            <a:r>
-              <a:rPr lang="en-US" sz="4000" spc="339" dirty="0">
-                <a:solidFill>
-                  <a:srgbClr val="000000"/>
-                </a:solidFill>
-                <a:latin typeface="Lato"/>
-              </a:rPr>
-              <a:t> </a:t>
-            </a:r>
-            <a:r>
-              <a:rPr lang="en-US" sz="4000" spc="339" dirty="0" err="1">
-                <a:solidFill>
-                  <a:srgbClr val="000000"/>
-                </a:solidFill>
-                <a:latin typeface="Lato"/>
-              </a:rPr>
-              <a:t>lado</a:t>
-            </a:r>
-            <a:r>
-              <a:rPr lang="en-US" sz="4000" spc="339" dirty="0">
-                <a:solidFill>
-                  <a:srgbClr val="000000"/>
-                </a:solidFill>
-                <a:latin typeface="Lato"/>
-              </a:rPr>
-              <a:t> </a:t>
-            </a:r>
-            <a:r>
-              <a:rPr lang="en-US" sz="4000" spc="339" dirty="0" err="1">
-                <a:solidFill>
-                  <a:srgbClr val="000000"/>
-                </a:solidFill>
-                <a:latin typeface="Lato"/>
-              </a:rPr>
-              <a:t>todos</a:t>
-            </a:r>
-            <a:r>
-              <a:rPr lang="en-US" sz="4000" spc="339" dirty="0">
-                <a:solidFill>
-                  <a:srgbClr val="000000"/>
-                </a:solidFill>
-                <a:latin typeface="Lato"/>
-              </a:rPr>
-              <a:t> </a:t>
-            </a:r>
-            <a:r>
-              <a:rPr lang="en-US" sz="4000" spc="339" dirty="0" err="1">
-                <a:solidFill>
-                  <a:srgbClr val="000000"/>
-                </a:solidFill>
-                <a:latin typeface="Lato"/>
-              </a:rPr>
-              <a:t>os</a:t>
-            </a:r>
-            <a:r>
-              <a:rPr lang="en-US" sz="4000" spc="339" dirty="0">
-                <a:solidFill>
-                  <a:srgbClr val="000000"/>
-                </a:solidFill>
-                <a:latin typeface="Lato"/>
-              </a:rPr>
-              <a:t> </a:t>
-            </a:r>
-            <a:r>
-              <a:rPr lang="en-US" sz="4000" spc="339" dirty="0" err="1">
-                <a:solidFill>
-                  <a:srgbClr val="000000"/>
-                </a:solidFill>
-                <a:latin typeface="Lato"/>
-              </a:rPr>
-              <a:t>componentes</a:t>
-            </a:r>
-            <a:r>
-              <a:rPr lang="en-US" sz="4000" spc="339" dirty="0">
-                <a:solidFill>
-                  <a:srgbClr val="000000"/>
-                </a:solidFill>
-                <a:latin typeface="Lato"/>
-              </a:rPr>
-              <a:t> </a:t>
-            </a:r>
-            <a:r>
-              <a:rPr lang="en-US" sz="4000" spc="339" dirty="0" err="1">
-                <a:solidFill>
-                  <a:srgbClr val="000000"/>
-                </a:solidFill>
-                <a:latin typeface="Lato"/>
-              </a:rPr>
-              <a:t>em</a:t>
-            </a:r>
-            <a:r>
-              <a:rPr lang="en-US" sz="4000" spc="339" dirty="0">
-                <a:solidFill>
-                  <a:srgbClr val="000000"/>
-                </a:solidFill>
-                <a:latin typeface="Lato"/>
-              </a:rPr>
-              <a:t> </a:t>
-            </a:r>
-            <a:r>
-              <a:rPr lang="en-US" sz="4000" spc="339" dirty="0" err="1">
-                <a:solidFill>
-                  <a:srgbClr val="000000"/>
-                </a:solidFill>
-                <a:latin typeface="Lato"/>
-              </a:rPr>
-              <a:t>amarelo</a:t>
-            </a:r>
-            <a:r>
-              <a:rPr lang="en-US" sz="4000" spc="339" dirty="0">
-                <a:solidFill>
-                  <a:srgbClr val="000000"/>
-                </a:solidFill>
-                <a:latin typeface="Lato"/>
-              </a:rPr>
-              <a:t> </a:t>
-            </a:r>
-            <a:r>
-              <a:rPr lang="en-US" sz="4000" spc="339" dirty="0" err="1">
-                <a:solidFill>
-                  <a:srgbClr val="000000"/>
-                </a:solidFill>
-                <a:latin typeface="Lato"/>
-              </a:rPr>
-              <a:t>são</a:t>
-            </a:r>
-            <a:r>
-              <a:rPr lang="en-US" sz="4000" spc="339" dirty="0">
-                <a:solidFill>
-                  <a:srgbClr val="000000"/>
-                </a:solidFill>
-                <a:latin typeface="Lato"/>
-              </a:rPr>
-              <a:t> </a:t>
-            </a:r>
-            <a:r>
-              <a:rPr lang="en-US" sz="4000" spc="339" dirty="0" err="1">
-                <a:solidFill>
-                  <a:srgbClr val="000000"/>
-                </a:solidFill>
-                <a:latin typeface="Lato"/>
-              </a:rPr>
-              <a:t>estados</a:t>
-            </a:r>
-            <a:r>
-              <a:rPr lang="en-US" sz="4000" spc="339" dirty="0">
-                <a:solidFill>
-                  <a:srgbClr val="000000"/>
-                </a:solidFill>
-                <a:latin typeface="Lato"/>
-              </a:rPr>
-              <a:t>;</a:t>
-            </a:r>
-            <a:endParaRPr lang="en-US" sz="4000" spc="339" dirty="0">
-              <a:solidFill>
-                <a:srgbClr val="000000"/>
-              </a:solidFill>
-              <a:latin typeface="Lato"/>
-              <a:ea typeface="Lato"/>
-              <a:cs typeface="Lato"/>
-            </a:endParaRPr>
-          </a:p>
-          <a:p>
-            <a:pPr marL="733425" lvl="1" indent="-367030" algn="just">
-              <a:lnSpc>
-                <a:spcPts val="4759"/>
-              </a:lnSpc>
-              <a:buFont typeface="Arial"/>
-              <a:buChar char="•"/>
-            </a:pPr>
-            <a:r>
-              <a:rPr lang="en-US" sz="4000" spc="339" dirty="0">
-                <a:solidFill>
-                  <a:srgbClr val="000000"/>
-                </a:solidFill>
-                <a:latin typeface="Lato"/>
-              </a:rPr>
-              <a:t>Caso o </a:t>
-            </a:r>
-            <a:r>
-              <a:rPr lang="en-US" sz="4000" spc="339" err="1">
-                <a:solidFill>
-                  <a:srgbClr val="000000"/>
-                </a:solidFill>
-                <a:latin typeface="Lato"/>
-              </a:rPr>
-              <a:t>usuário</a:t>
-            </a:r>
-            <a:r>
-              <a:rPr lang="en-US" sz="4000" spc="339" dirty="0">
-                <a:solidFill>
-                  <a:srgbClr val="000000"/>
-                </a:solidFill>
-                <a:latin typeface="Lato"/>
-              </a:rPr>
-              <a:t> realize </a:t>
-            </a:r>
-            <a:r>
-              <a:rPr lang="en-US" sz="4000" spc="339" err="1">
-                <a:solidFill>
-                  <a:srgbClr val="000000"/>
-                </a:solidFill>
-                <a:latin typeface="Lato"/>
-              </a:rPr>
-              <a:t>alguma</a:t>
-            </a:r>
-            <a:r>
-              <a:rPr lang="en-US" sz="4000" spc="339" dirty="0">
-                <a:solidFill>
-                  <a:srgbClr val="000000"/>
-                </a:solidFill>
-                <a:latin typeface="Lato"/>
-              </a:rPr>
-              <a:t> </a:t>
-            </a:r>
-            <a:r>
-              <a:rPr lang="en-US" sz="4000" spc="339" err="1">
-                <a:solidFill>
-                  <a:srgbClr val="000000"/>
-                </a:solidFill>
-                <a:latin typeface="Lato"/>
-              </a:rPr>
-              <a:t>ação</a:t>
-            </a:r>
-            <a:r>
-              <a:rPr lang="en-US" sz="4000" spc="339" dirty="0">
-                <a:solidFill>
-                  <a:srgbClr val="000000"/>
-                </a:solidFill>
-                <a:latin typeface="Lato"/>
-              </a:rPr>
-              <a:t>, o </a:t>
-            </a:r>
-            <a:r>
-              <a:rPr lang="en-US" sz="4000" spc="339" err="1">
-                <a:solidFill>
-                  <a:srgbClr val="000000"/>
-                </a:solidFill>
-                <a:latin typeface="Lato"/>
-              </a:rPr>
-              <a:t>mesmo</a:t>
-            </a:r>
-            <a:r>
-              <a:rPr lang="en-US" sz="4000" spc="339" dirty="0">
-                <a:solidFill>
-                  <a:srgbClr val="000000"/>
-                </a:solidFill>
-                <a:latin typeface="Lato"/>
-              </a:rPr>
-              <a:t> </a:t>
-            </a:r>
-            <a:r>
-              <a:rPr lang="en-US" sz="4000" spc="339" err="1">
-                <a:solidFill>
-                  <a:srgbClr val="000000"/>
-                </a:solidFill>
-                <a:latin typeface="Lato"/>
-              </a:rPr>
-              <a:t>não</a:t>
-            </a:r>
-            <a:r>
-              <a:rPr lang="en-US" sz="4000" spc="339" dirty="0">
-                <a:solidFill>
-                  <a:srgbClr val="000000"/>
-                </a:solidFill>
-                <a:latin typeface="Lato"/>
-              </a:rPr>
-              <a:t> </a:t>
-            </a:r>
-            <a:r>
-              <a:rPr lang="en-US" sz="4000" spc="339" err="1">
-                <a:solidFill>
-                  <a:srgbClr val="000000"/>
-                </a:solidFill>
-                <a:latin typeface="Lato"/>
-              </a:rPr>
-              <a:t>será</a:t>
-            </a:r>
-            <a:r>
-              <a:rPr lang="en-US" sz="4000" spc="339" dirty="0">
-                <a:solidFill>
-                  <a:srgbClr val="000000"/>
-                </a:solidFill>
-                <a:latin typeface="Lato"/>
-              </a:rPr>
-              <a:t> </a:t>
-            </a:r>
-            <a:r>
-              <a:rPr lang="en-US" sz="4000" spc="339" err="1">
-                <a:solidFill>
-                  <a:srgbClr val="000000"/>
-                </a:solidFill>
-                <a:latin typeface="Lato"/>
-              </a:rPr>
-              <a:t>direcionado</a:t>
-            </a:r>
-            <a:r>
-              <a:rPr lang="en-US" sz="4000" spc="339" dirty="0">
-                <a:solidFill>
-                  <a:srgbClr val="000000"/>
-                </a:solidFill>
-                <a:latin typeface="Lato"/>
-              </a:rPr>
-              <a:t> para </a:t>
-            </a:r>
-            <a:r>
-              <a:rPr lang="en-US" sz="4000" spc="339" err="1">
-                <a:solidFill>
-                  <a:srgbClr val="000000"/>
-                </a:solidFill>
-                <a:latin typeface="Lato"/>
-              </a:rPr>
-              <a:t>outra</a:t>
-            </a:r>
-            <a:r>
-              <a:rPr lang="en-US" sz="4000" spc="339" dirty="0">
-                <a:solidFill>
-                  <a:srgbClr val="000000"/>
-                </a:solidFill>
-                <a:latin typeface="Lato"/>
-              </a:rPr>
-              <a:t> </a:t>
-            </a:r>
-            <a:r>
-              <a:rPr lang="en-US" sz="4000" spc="339" err="1">
-                <a:solidFill>
-                  <a:srgbClr val="000000"/>
-                </a:solidFill>
-                <a:latin typeface="Lato"/>
-              </a:rPr>
-              <a:t>página</a:t>
-            </a:r>
-            <a:r>
-              <a:rPr lang="en-US" sz="4000" spc="339" dirty="0">
-                <a:solidFill>
-                  <a:srgbClr val="000000"/>
-                </a:solidFill>
-                <a:latin typeface="Lato"/>
-              </a:rPr>
-              <a:t>, o </a:t>
-            </a:r>
-            <a:r>
-              <a:rPr lang="en-US" sz="4000" spc="339" err="1">
-                <a:solidFill>
-                  <a:srgbClr val="000000"/>
-                </a:solidFill>
-                <a:latin typeface="Lato"/>
-              </a:rPr>
-              <a:t>estado</a:t>
-            </a:r>
-            <a:r>
-              <a:rPr lang="en-US" sz="4000" spc="339" dirty="0">
-                <a:solidFill>
-                  <a:srgbClr val="000000"/>
-                </a:solidFill>
-                <a:latin typeface="Lato"/>
-              </a:rPr>
-              <a:t> da </a:t>
-            </a:r>
-            <a:r>
-              <a:rPr lang="en-US" sz="4000" spc="339" err="1">
-                <a:solidFill>
-                  <a:srgbClr val="000000"/>
-                </a:solidFill>
-                <a:latin typeface="Lato"/>
-              </a:rPr>
-              <a:t>página</a:t>
-            </a:r>
-            <a:r>
-              <a:rPr lang="en-US" sz="4000" spc="339" dirty="0">
-                <a:solidFill>
-                  <a:srgbClr val="000000"/>
-                </a:solidFill>
-                <a:latin typeface="Lato"/>
-              </a:rPr>
-              <a:t> </a:t>
-            </a:r>
-            <a:r>
-              <a:rPr lang="en-US" sz="4000" spc="339" err="1">
-                <a:solidFill>
-                  <a:srgbClr val="000000"/>
-                </a:solidFill>
-                <a:latin typeface="Lato"/>
-              </a:rPr>
-              <a:t>será</a:t>
-            </a:r>
-            <a:r>
-              <a:rPr lang="en-US" sz="4000" spc="339" dirty="0">
-                <a:solidFill>
-                  <a:srgbClr val="000000"/>
-                </a:solidFill>
-                <a:latin typeface="Lato"/>
-              </a:rPr>
-              <a:t> </a:t>
-            </a:r>
-            <a:r>
-              <a:rPr lang="en-US" sz="4000" spc="339" err="1">
-                <a:solidFill>
-                  <a:srgbClr val="000000"/>
-                </a:solidFill>
-                <a:latin typeface="Lato"/>
-              </a:rPr>
-              <a:t>atualizado</a:t>
-            </a:r>
-            <a:r>
-              <a:rPr lang="en-US" sz="4000" spc="339" dirty="0">
-                <a:solidFill>
-                  <a:srgbClr val="000000"/>
-                </a:solidFill>
-                <a:latin typeface="Lato"/>
-              </a:rPr>
-              <a:t>.</a:t>
-            </a:r>
-            <a:endParaRPr lang="en-US" sz="4000" spc="339" dirty="0">
-              <a:solidFill>
-                <a:srgbClr val="000000"/>
-              </a:solidFill>
-              <a:latin typeface="Lato"/>
-              <a:ea typeface="Lato"/>
-              <a:cs typeface="Lato"/>
-            </a:endParaRPr>
-          </a:p>
-        </p:txBody>
-      </p:sp>
-      <p:sp>
-        <p:nvSpPr>
-          <p:cNvPr id="7" name="TextBox 7"/>
-          <p:cNvSpPr txBox="1"/>
-          <p:nvPr/>
-        </p:nvSpPr>
-        <p:spPr>
-          <a:xfrm>
-            <a:off x="10515600" y="8001711"/>
-            <a:ext cx="7772400" cy="1346522"/>
+            <a:off x="614962" y="1631918"/>
+            <a:ext cx="16876629" cy="7386638"/>
           </a:xfrm>
           <a:prstGeom prst="rect">
             <a:avLst/>
@@ -6560,40 +5713,42 @@
           </a:bodyPr>
           <a:lstStyle/>
           <a:p>
-            <a:pPr algn="ctr">
+            <a:pPr marL="733425" lvl="1" indent="-367030" algn="just">
               <a:lnSpc>
-                <a:spcPts val="3499"/>
+                <a:spcPts val="4759"/>
               </a:lnSpc>
+              <a:buFont typeface="Arial"/>
+              <a:buChar char="•"/>
             </a:pPr>
             <a:r>
-              <a:rPr lang="en-US" sz="2300" spc="249" dirty="0" err="1">
-                <a:solidFill>
-                  <a:srgbClr val="000000"/>
-                </a:solidFill>
-                <a:latin typeface="Lato"/>
-              </a:rPr>
-              <a:t>Figura</a:t>
-            </a:r>
-            <a:r>
-              <a:rPr lang="en-US" sz="2300" spc="249" dirty="0">
-                <a:solidFill>
-                  <a:srgbClr val="000000"/>
-                </a:solidFill>
-                <a:latin typeface="Lato"/>
-              </a:rPr>
-              <a:t> 01 - </a:t>
-            </a:r>
-            <a:r>
-              <a:rPr lang="en-US" sz="2300" spc="249" dirty="0" err="1">
-                <a:solidFill>
-                  <a:srgbClr val="000000"/>
-                </a:solidFill>
-                <a:latin typeface="Lato"/>
-              </a:rPr>
-              <a:t>Stateful</a:t>
-            </a:r>
-            <a:r>
-              <a:rPr lang="en-US" sz="2300" spc="249" dirty="0">
+              <a:rPr lang="en-US" sz="4000" spc="339" err="1">
+                <a:solidFill>
+                  <a:srgbClr val="000000"/>
+                </a:solidFill>
+                <a:latin typeface="Lato"/>
+              </a:rPr>
+              <a:t>Os</a:t>
+            </a:r>
+            <a:r>
+              <a:rPr lang="en-US" sz="4000" spc="339" dirty="0">
+                <a:solidFill>
+                  <a:srgbClr val="000000"/>
+                </a:solidFill>
+                <a:latin typeface="Lato"/>
+              </a:rPr>
+              <a:t> Widgets que </a:t>
+            </a:r>
+            <a:r>
+              <a:rPr lang="en-US" sz="4000" spc="339" err="1">
+                <a:solidFill>
+                  <a:srgbClr val="000000"/>
+                </a:solidFill>
+                <a:latin typeface="Lato"/>
+              </a:rPr>
+              <a:t>possuem</a:t>
+            </a:r>
+            <a:r>
+              <a:rPr lang="en-US" sz="4000" spc="339" dirty="0">
                 <a:solidFill>
                   <a:srgbClr val="000000"/>
                 </a:solidFill>
@@ -6602,66 +5757,888 @@
               <a:t> </a:t>
             </a:r>
             <a:r>
-              <a:rPr lang="en-US" sz="2300" spc="249" dirty="0" err="1">
-                <a:solidFill>
-                  <a:srgbClr val="000000"/>
-                </a:solidFill>
-                <a:latin typeface="Lato"/>
-              </a:rPr>
-              <a:t>Wiget</a:t>
-            </a:r>
-            <a:endParaRPr lang="en-US" sz="2300" spc="249" dirty="0">
+              <a:rPr lang="en-US" sz="4000" spc="339" err="1">
+                <a:solidFill>
+                  <a:srgbClr val="000000"/>
+                </a:solidFill>
+                <a:latin typeface="Lato"/>
+              </a:rPr>
+              <a:t>estado</a:t>
+            </a:r>
+            <a:r>
+              <a:rPr lang="en-US" sz="4000" spc="339" dirty="0">
+                <a:solidFill>
+                  <a:srgbClr val="000000"/>
+                </a:solidFill>
+                <a:latin typeface="Lato"/>
+              </a:rPr>
+              <a:t> </a:t>
+            </a:r>
+            <a:r>
+              <a:rPr lang="en-US" sz="4000" spc="339" err="1">
+                <a:solidFill>
+                  <a:srgbClr val="000000"/>
+                </a:solidFill>
+                <a:latin typeface="Lato"/>
+              </a:rPr>
+              <a:t>são</a:t>
+            </a:r>
+            <a:r>
+              <a:rPr lang="en-US" sz="4000" spc="339" dirty="0">
+                <a:solidFill>
+                  <a:srgbClr val="000000"/>
+                </a:solidFill>
+                <a:latin typeface="Lato"/>
+              </a:rPr>
+              <a:t> </a:t>
+            </a:r>
+            <a:r>
+              <a:rPr lang="en-US" sz="4000" spc="339" err="1">
+                <a:solidFill>
+                  <a:srgbClr val="000000"/>
+                </a:solidFill>
+                <a:latin typeface="Lato"/>
+              </a:rPr>
+              <a:t>denominados</a:t>
+            </a:r>
+            <a:r>
+              <a:rPr lang="en-US" sz="4000" spc="339" dirty="0">
+                <a:solidFill>
+                  <a:srgbClr val="000000"/>
+                </a:solidFill>
+                <a:latin typeface="Lato"/>
+              </a:rPr>
+              <a:t> de Stateful Widget;</a:t>
+            </a:r>
+            <a:endParaRPr lang="en-US" sz="4000" spc="339" dirty="0">
               <a:solidFill>
                 <a:srgbClr val="000000"/>
               </a:solidFill>
               <a:latin typeface="Lato"/>
+              <a:ea typeface="Lato"/>
+              <a:cs typeface="Lato"/>
             </a:endParaRPr>
           </a:p>
           <a:p>
-            <a:pPr algn="ctr">
+            <a:pPr marL="733425" lvl="1" indent="-367030" algn="just">
               <a:lnSpc>
-                <a:spcPts val="3499"/>
+                <a:spcPts val="4759"/>
               </a:lnSpc>
-              <a:spcBef>
-                <a:spcPct val="0"/>
-              </a:spcBef>
+              <a:buFont typeface="Arial"/>
+              <a:buChar char="•"/>
             </a:pPr>
-            <a:r>
-              <a:rPr lang="en-US" sz="2300" spc="249" dirty="0" err="1">
-                <a:solidFill>
-                  <a:srgbClr val="000000"/>
-                </a:solidFill>
-                <a:latin typeface="Lato"/>
-              </a:rPr>
-              <a:t>Fonte</a:t>
-            </a:r>
-            <a:r>
-              <a:rPr lang="en-US" sz="2300" spc="249" dirty="0">
-                <a:solidFill>
-                  <a:srgbClr val="000000"/>
-                </a:solidFill>
-                <a:latin typeface="Lato"/>
-              </a:rPr>
-              <a:t>: </a:t>
-            </a:r>
-            <a:r>
-              <a:rPr lang="en-US" spc="249" dirty="0">
-                <a:solidFill>
-                  <a:srgbClr val="000000"/>
-                </a:solidFill>
-                <a:latin typeface="Lato"/>
-                <a:hlinkClick r:id="rId3"/>
-              </a:rPr>
-              <a:t>https://medium.com/tableless/entendendo-os-tipos-de-widgets-do-flutter-de9bb9296bf6</a:t>
-            </a:r>
-            <a:r>
-              <a:rPr lang="en-US" spc="249" dirty="0">
-                <a:solidFill>
-                  <a:srgbClr val="000000"/>
-                </a:solidFill>
-                <a:latin typeface="Lato"/>
-              </a:rPr>
-              <a:t>.</a:t>
+            <a:endParaRPr lang="en-US" sz="4000" spc="339" dirty="0">
+              <a:solidFill>
+                <a:srgbClr val="000000"/>
+              </a:solidFill>
+              <a:latin typeface="Lato"/>
+              <a:ea typeface="Lato"/>
+              <a:cs typeface="Lato"/>
+            </a:endParaRPr>
+          </a:p>
+          <a:p>
+            <a:pPr marL="733425" lvl="1" indent="-367030" algn="just">
+              <a:lnSpc>
+                <a:spcPts val="4759"/>
+              </a:lnSpc>
+              <a:buFont typeface="Arial"/>
+              <a:buChar char="•"/>
+            </a:pPr>
+            <a:r>
+              <a:rPr lang="en-US" sz="4000" spc="339" dirty="0">
+                <a:solidFill>
+                  <a:srgbClr val="000000"/>
+                </a:solidFill>
+                <a:latin typeface="Lato"/>
+                <a:ea typeface="Lato"/>
+                <a:cs typeface="Lato"/>
+              </a:rPr>
+              <a:t>Ele é um widget que </a:t>
+            </a:r>
+            <a:r>
+              <a:rPr lang="en-US" sz="4000" spc="339" err="1">
+                <a:solidFill>
+                  <a:srgbClr val="000000"/>
+                </a:solidFill>
+                <a:latin typeface="Lato"/>
+                <a:ea typeface="Lato"/>
+                <a:cs typeface="Lato"/>
+              </a:rPr>
+              <a:t>pode</a:t>
+            </a:r>
+            <a:r>
+              <a:rPr lang="en-US" sz="4000" spc="339" dirty="0">
+                <a:solidFill>
+                  <a:srgbClr val="000000"/>
+                </a:solidFill>
+                <a:latin typeface="Lato"/>
+                <a:ea typeface="Lato"/>
+                <a:cs typeface="Lato"/>
+              </a:rPr>
+              <a:t> mudar </a:t>
+            </a:r>
+            <a:r>
+              <a:rPr lang="en-US" sz="4000" spc="339" err="1">
+                <a:solidFill>
+                  <a:srgbClr val="000000"/>
+                </a:solidFill>
+                <a:latin typeface="Lato"/>
+                <a:ea typeface="Lato"/>
+                <a:cs typeface="Lato"/>
+              </a:rPr>
+              <a:t>seu</a:t>
+            </a:r>
+            <a:r>
+              <a:rPr lang="en-US" sz="4000" spc="339" dirty="0">
+                <a:solidFill>
+                  <a:srgbClr val="000000"/>
+                </a:solidFill>
+                <a:latin typeface="Lato"/>
+                <a:ea typeface="Lato"/>
+                <a:cs typeface="Lato"/>
+              </a:rPr>
+              <a:t> </a:t>
+            </a:r>
+            <a:r>
+              <a:rPr lang="en-US" sz="4000" spc="339" err="1">
+                <a:solidFill>
+                  <a:srgbClr val="000000"/>
+                </a:solidFill>
+                <a:latin typeface="Lato"/>
+                <a:ea typeface="Lato"/>
+                <a:cs typeface="Lato"/>
+              </a:rPr>
+              <a:t>estado</a:t>
+            </a:r>
+            <a:r>
+              <a:rPr lang="en-US" sz="4000" spc="339" dirty="0">
+                <a:solidFill>
+                  <a:srgbClr val="000000"/>
+                </a:solidFill>
+                <a:latin typeface="Lato"/>
+                <a:ea typeface="Lato"/>
+                <a:cs typeface="Lato"/>
+              </a:rPr>
+              <a:t> </a:t>
+            </a:r>
+            <a:r>
+              <a:rPr lang="en-US" sz="4000" spc="339" err="1">
+                <a:solidFill>
+                  <a:srgbClr val="000000"/>
+                </a:solidFill>
+                <a:latin typeface="Lato"/>
+                <a:ea typeface="Lato"/>
+                <a:cs typeface="Lato"/>
+              </a:rPr>
+              <a:t>ao</a:t>
+            </a:r>
+            <a:r>
+              <a:rPr lang="en-US" sz="4000" spc="339" dirty="0">
+                <a:solidFill>
+                  <a:srgbClr val="000000"/>
+                </a:solidFill>
+                <a:latin typeface="Lato"/>
+                <a:ea typeface="Lato"/>
+                <a:cs typeface="Lato"/>
+              </a:rPr>
+              <a:t> </a:t>
+            </a:r>
+            <a:r>
+              <a:rPr lang="en-US" sz="4000" spc="339" err="1">
+                <a:solidFill>
+                  <a:srgbClr val="000000"/>
+                </a:solidFill>
+                <a:latin typeface="Lato"/>
+                <a:ea typeface="Lato"/>
+                <a:cs typeface="Lato"/>
+              </a:rPr>
+              <a:t>longo</a:t>
+            </a:r>
+            <a:r>
+              <a:rPr lang="en-US" sz="4000" spc="339" dirty="0">
+                <a:solidFill>
+                  <a:srgbClr val="000000"/>
+                </a:solidFill>
+                <a:latin typeface="Lato"/>
+                <a:ea typeface="Lato"/>
+                <a:cs typeface="Lato"/>
+              </a:rPr>
+              <a:t> do tempo. Ele é </a:t>
+            </a:r>
+            <a:r>
+              <a:rPr lang="en-US" sz="4000" spc="339" err="1">
+                <a:solidFill>
+                  <a:srgbClr val="000000"/>
+                </a:solidFill>
+                <a:latin typeface="Lato"/>
+                <a:ea typeface="Lato"/>
+                <a:cs typeface="Lato"/>
+              </a:rPr>
+              <a:t>usado</a:t>
+            </a:r>
+            <a:r>
+              <a:rPr lang="en-US" sz="4000" spc="339" dirty="0">
+                <a:solidFill>
+                  <a:srgbClr val="000000"/>
+                </a:solidFill>
+                <a:latin typeface="Lato"/>
+                <a:ea typeface="Lato"/>
+                <a:cs typeface="Lato"/>
+              </a:rPr>
+              <a:t> para </a:t>
+            </a:r>
+            <a:r>
+              <a:rPr lang="en-US" sz="4000" spc="339" err="1">
+                <a:solidFill>
+                  <a:srgbClr val="000000"/>
+                </a:solidFill>
+                <a:latin typeface="Lato"/>
+                <a:ea typeface="Lato"/>
+                <a:cs typeface="Lato"/>
+              </a:rPr>
+              <a:t>elementos</a:t>
+            </a:r>
+            <a:r>
+              <a:rPr lang="en-US" sz="4000" spc="339" dirty="0">
+                <a:solidFill>
+                  <a:srgbClr val="000000"/>
+                </a:solidFill>
+                <a:latin typeface="Lato"/>
+                <a:ea typeface="Lato"/>
+                <a:cs typeface="Lato"/>
+              </a:rPr>
+              <a:t> </a:t>
+            </a:r>
+            <a:r>
+              <a:rPr lang="en-US" sz="4000" spc="339" err="1">
+                <a:solidFill>
+                  <a:srgbClr val="000000"/>
+                </a:solidFill>
+                <a:latin typeface="Lato"/>
+                <a:ea typeface="Lato"/>
+                <a:cs typeface="Lato"/>
+              </a:rPr>
+              <a:t>interativos</a:t>
+            </a:r>
+            <a:r>
+              <a:rPr lang="en-US" sz="4000" spc="339" dirty="0">
+                <a:solidFill>
+                  <a:srgbClr val="000000"/>
+                </a:solidFill>
+                <a:latin typeface="Lato"/>
+                <a:ea typeface="Lato"/>
+                <a:cs typeface="Lato"/>
+              </a:rPr>
+              <a:t> </a:t>
+            </a:r>
+            <a:r>
+              <a:rPr lang="en-US" sz="4000" spc="339" err="1">
+                <a:solidFill>
+                  <a:srgbClr val="000000"/>
+                </a:solidFill>
+                <a:latin typeface="Lato"/>
+                <a:ea typeface="Lato"/>
+                <a:cs typeface="Lato"/>
+              </a:rPr>
+              <a:t>ou</a:t>
+            </a:r>
+            <a:r>
+              <a:rPr lang="en-US" sz="4000" spc="339" dirty="0">
+                <a:solidFill>
+                  <a:srgbClr val="000000"/>
+                </a:solidFill>
+                <a:latin typeface="Lato"/>
+                <a:ea typeface="Lato"/>
+                <a:cs typeface="Lato"/>
+              </a:rPr>
+              <a:t> </a:t>
+            </a:r>
+            <a:r>
+              <a:rPr lang="en-US" sz="4000" spc="339" err="1">
+                <a:solidFill>
+                  <a:srgbClr val="000000"/>
+                </a:solidFill>
+                <a:latin typeface="Lato"/>
+                <a:ea typeface="Lato"/>
+                <a:cs typeface="Lato"/>
+              </a:rPr>
+              <a:t>dinâmicos</a:t>
+            </a:r>
+            <a:r>
+              <a:rPr lang="en-US" sz="4000" spc="339" dirty="0">
+                <a:solidFill>
+                  <a:srgbClr val="000000"/>
+                </a:solidFill>
+                <a:latin typeface="Lato"/>
+                <a:ea typeface="Lato"/>
+                <a:cs typeface="Lato"/>
+              </a:rPr>
+              <a:t> </a:t>
+            </a:r>
+            <a:r>
+              <a:rPr lang="en-US" sz="4000" spc="339" err="1">
+                <a:solidFill>
+                  <a:srgbClr val="000000"/>
+                </a:solidFill>
+                <a:latin typeface="Lato"/>
+                <a:ea typeface="Lato"/>
+                <a:cs typeface="Lato"/>
+              </a:rPr>
+              <a:t>na</a:t>
+            </a:r>
+            <a:r>
+              <a:rPr lang="en-US" sz="4000" spc="339" dirty="0">
+                <a:solidFill>
+                  <a:srgbClr val="000000"/>
+                </a:solidFill>
+                <a:latin typeface="Lato"/>
+                <a:ea typeface="Lato"/>
+                <a:cs typeface="Lato"/>
+              </a:rPr>
+              <a:t> interface;</a:t>
+            </a:r>
+          </a:p>
+          <a:p>
+            <a:pPr marL="733425" lvl="1" indent="-367030" algn="just">
+              <a:lnSpc>
+                <a:spcPts val="4759"/>
+              </a:lnSpc>
+              <a:buFont typeface="Arial"/>
+              <a:buChar char="•"/>
+            </a:pPr>
+            <a:endParaRPr lang="en-US" sz="4000" spc="339" dirty="0">
+              <a:solidFill>
+                <a:srgbClr val="000000"/>
+              </a:solidFill>
+              <a:latin typeface="Lato"/>
+              <a:ea typeface="Lato"/>
+              <a:cs typeface="Lato"/>
+            </a:endParaRPr>
+          </a:p>
+          <a:p>
+            <a:pPr marL="733425" lvl="1" indent="-367030" algn="just">
+              <a:lnSpc>
+                <a:spcPts val="4759"/>
+              </a:lnSpc>
+              <a:buFont typeface="Arial"/>
+              <a:buChar char="•"/>
+            </a:pPr>
+            <a:r>
+              <a:rPr lang="en-US" sz="4000" spc="339" dirty="0">
+                <a:solidFill>
+                  <a:srgbClr val="000000"/>
+                </a:solidFill>
+                <a:latin typeface="Lato"/>
+                <a:ea typeface="Lato"/>
+                <a:cs typeface="Lato"/>
+              </a:rPr>
+              <a:t>Eles </a:t>
+            </a:r>
+            <a:r>
+              <a:rPr lang="en-US" sz="4000" spc="339" dirty="0" err="1">
+                <a:solidFill>
+                  <a:srgbClr val="000000"/>
+                </a:solidFill>
+                <a:latin typeface="Lato"/>
+                <a:ea typeface="Lato"/>
+                <a:cs typeface="Lato"/>
+              </a:rPr>
+              <a:t>são</a:t>
+            </a:r>
+            <a:r>
+              <a:rPr lang="en-US" sz="4000" spc="339" dirty="0">
+                <a:solidFill>
+                  <a:srgbClr val="000000"/>
+                </a:solidFill>
+                <a:latin typeface="Lato"/>
+                <a:ea typeface="Lato"/>
+                <a:cs typeface="Lato"/>
+              </a:rPr>
+              <a:t> </a:t>
+            </a:r>
+            <a:r>
+              <a:rPr lang="en-US" sz="4000" spc="339" dirty="0" err="1">
+                <a:solidFill>
+                  <a:srgbClr val="000000"/>
+                </a:solidFill>
+                <a:latin typeface="Lato"/>
+                <a:ea typeface="Lato"/>
+                <a:cs typeface="Lato"/>
+              </a:rPr>
+              <a:t>amplamente</a:t>
+            </a:r>
+            <a:r>
+              <a:rPr lang="en-US" sz="4000" spc="339" dirty="0">
+                <a:solidFill>
+                  <a:srgbClr val="000000"/>
+                </a:solidFill>
+                <a:latin typeface="Lato"/>
+                <a:ea typeface="Lato"/>
+                <a:cs typeface="Lato"/>
+              </a:rPr>
+              <a:t> </a:t>
+            </a:r>
+            <a:r>
+              <a:rPr lang="en-US" sz="4000" spc="339" dirty="0" err="1">
+                <a:solidFill>
+                  <a:srgbClr val="000000"/>
+                </a:solidFill>
+                <a:latin typeface="Lato"/>
+                <a:ea typeface="Lato"/>
+                <a:cs typeface="Lato"/>
+              </a:rPr>
+              <a:t>utilizados</a:t>
+            </a:r>
+            <a:r>
+              <a:rPr lang="en-US" sz="4000" spc="339" dirty="0">
+                <a:solidFill>
+                  <a:srgbClr val="000000"/>
+                </a:solidFill>
+                <a:latin typeface="Lato"/>
+                <a:ea typeface="Lato"/>
+                <a:cs typeface="Lato"/>
+              </a:rPr>
+              <a:t> para </a:t>
+            </a:r>
+            <a:r>
+              <a:rPr lang="en-US" sz="4000" spc="339" dirty="0" err="1">
+                <a:solidFill>
+                  <a:srgbClr val="000000"/>
+                </a:solidFill>
+                <a:latin typeface="Lato"/>
+                <a:ea typeface="Lato"/>
+                <a:cs typeface="Lato"/>
+              </a:rPr>
+              <a:t>para</a:t>
+            </a:r>
+            <a:r>
+              <a:rPr lang="en-US" sz="4000" spc="339" dirty="0">
+                <a:solidFill>
+                  <a:srgbClr val="000000"/>
+                </a:solidFill>
+                <a:latin typeface="Lato"/>
+                <a:ea typeface="Lato"/>
+                <a:cs typeface="Lato"/>
+              </a:rPr>
+              <a:t> </a:t>
+            </a:r>
+            <a:r>
+              <a:rPr lang="en-US" sz="4000" spc="339" dirty="0" err="1">
+                <a:solidFill>
+                  <a:srgbClr val="000000"/>
+                </a:solidFill>
+                <a:latin typeface="Lato"/>
+                <a:ea typeface="Lato"/>
+                <a:cs typeface="Lato"/>
+              </a:rPr>
+              <a:t>criar</a:t>
+            </a:r>
+            <a:r>
+              <a:rPr lang="en-US" sz="4000" spc="339" dirty="0">
+                <a:solidFill>
+                  <a:srgbClr val="000000"/>
+                </a:solidFill>
+                <a:latin typeface="Lato"/>
+                <a:ea typeface="Lato"/>
+                <a:cs typeface="Lato"/>
+              </a:rPr>
+              <a:t> </a:t>
+            </a:r>
+            <a:r>
+              <a:rPr lang="en-US" sz="4000" spc="339" dirty="0" err="1">
+                <a:solidFill>
+                  <a:srgbClr val="000000"/>
+                </a:solidFill>
+                <a:latin typeface="Lato"/>
+                <a:ea typeface="Lato"/>
+                <a:cs typeface="Lato"/>
+              </a:rPr>
+              <a:t>estruturas</a:t>
+            </a:r>
+            <a:r>
+              <a:rPr lang="en-US" sz="4000" spc="339" dirty="0">
+                <a:solidFill>
+                  <a:srgbClr val="000000"/>
+                </a:solidFill>
+                <a:latin typeface="Lato"/>
+                <a:ea typeface="Lato"/>
+                <a:cs typeface="Lato"/>
+              </a:rPr>
+              <a:t> </a:t>
+            </a:r>
+            <a:r>
+              <a:rPr lang="en-US" sz="4000" spc="339" dirty="0" err="1">
+                <a:solidFill>
+                  <a:srgbClr val="000000"/>
+                </a:solidFill>
+                <a:latin typeface="Lato"/>
+                <a:ea typeface="Lato"/>
+                <a:cs typeface="Lato"/>
+              </a:rPr>
+              <a:t>mutáveis</a:t>
+            </a:r>
+            <a:r>
+              <a:rPr lang="en-US" sz="4000" spc="339" dirty="0">
+                <a:solidFill>
+                  <a:srgbClr val="000000"/>
+                </a:solidFill>
+                <a:latin typeface="Lato"/>
+                <a:ea typeface="Lato"/>
+                <a:cs typeface="Lato"/>
+              </a:rPr>
+              <a:t> </a:t>
+            </a:r>
+            <a:r>
+              <a:rPr lang="en-US" sz="4000" spc="339" dirty="0" err="1">
+                <a:solidFill>
+                  <a:srgbClr val="000000"/>
+                </a:solidFill>
+                <a:latin typeface="Lato"/>
+                <a:ea typeface="Lato"/>
+                <a:cs typeface="Lato"/>
+              </a:rPr>
+              <a:t>nos</a:t>
+            </a:r>
+            <a:r>
+              <a:rPr lang="en-US" sz="4000" spc="339" dirty="0">
+                <a:solidFill>
+                  <a:srgbClr val="000000"/>
+                </a:solidFill>
+                <a:latin typeface="Lato"/>
+                <a:ea typeface="Lato"/>
+                <a:cs typeface="Lato"/>
+              </a:rPr>
+              <a:t> </a:t>
+            </a:r>
+            <a:r>
+              <a:rPr lang="en-US" sz="4000" spc="339" dirty="0" err="1">
+                <a:solidFill>
+                  <a:srgbClr val="000000"/>
+                </a:solidFill>
+                <a:latin typeface="Lato"/>
+                <a:ea typeface="Lato"/>
+                <a:cs typeface="Lato"/>
+              </a:rPr>
+              <a:t>aplicativos</a:t>
+            </a:r>
+            <a:r>
+              <a:rPr lang="en-US" sz="4000" spc="339" dirty="0">
+                <a:solidFill>
+                  <a:srgbClr val="000000"/>
+                </a:solidFill>
+                <a:latin typeface="Lato"/>
+                <a:ea typeface="Lato"/>
+                <a:cs typeface="Lato"/>
+              </a:rPr>
+              <a:t>, </a:t>
+            </a:r>
+            <a:r>
+              <a:rPr lang="en-US" sz="4000" spc="339" dirty="0" err="1">
+                <a:solidFill>
+                  <a:srgbClr val="000000"/>
+                </a:solidFill>
+                <a:latin typeface="Lato"/>
+                <a:ea typeface="Lato"/>
+                <a:cs typeface="Lato"/>
+              </a:rPr>
+              <a:t>ou</a:t>
+            </a:r>
+            <a:r>
+              <a:rPr lang="en-US" sz="4000" spc="339" dirty="0">
+                <a:solidFill>
+                  <a:srgbClr val="000000"/>
+                </a:solidFill>
+                <a:latin typeface="Lato"/>
+                <a:ea typeface="Lato"/>
+                <a:cs typeface="Lato"/>
+              </a:rPr>
+              <a:t> </a:t>
+            </a:r>
+            <a:r>
+              <a:rPr lang="en-US" sz="4000" spc="339" dirty="0" err="1">
+                <a:solidFill>
+                  <a:srgbClr val="000000"/>
+                </a:solidFill>
+                <a:latin typeface="Lato"/>
+                <a:ea typeface="Lato"/>
+                <a:cs typeface="Lato"/>
+              </a:rPr>
+              <a:t>seja</a:t>
+            </a:r>
+            <a:r>
+              <a:rPr lang="en-US" sz="4000" spc="339" dirty="0">
+                <a:solidFill>
+                  <a:srgbClr val="000000"/>
+                </a:solidFill>
+                <a:latin typeface="Lato"/>
+                <a:ea typeface="Lato"/>
+                <a:cs typeface="Lato"/>
+              </a:rPr>
+              <a:t>, </a:t>
+            </a:r>
+            <a:r>
+              <a:rPr lang="en-US" sz="4000" spc="339" dirty="0" err="1">
+                <a:solidFill>
+                  <a:srgbClr val="000000"/>
+                </a:solidFill>
+                <a:latin typeface="Lato"/>
+                <a:ea typeface="Lato"/>
+                <a:cs typeface="Lato"/>
+              </a:rPr>
+              <a:t>elementos</a:t>
+            </a:r>
+            <a:r>
+              <a:rPr lang="en-US" sz="4000" spc="339" dirty="0">
+                <a:solidFill>
+                  <a:srgbClr val="000000"/>
+                </a:solidFill>
+                <a:latin typeface="Lato"/>
+                <a:ea typeface="Lato"/>
+                <a:cs typeface="Lato"/>
+              </a:rPr>
+              <a:t> da interface que </a:t>
+            </a:r>
+            <a:r>
+              <a:rPr lang="en-US" sz="4000" spc="339" dirty="0" err="1">
+                <a:solidFill>
+                  <a:srgbClr val="000000"/>
+                </a:solidFill>
+                <a:latin typeface="Lato"/>
+                <a:ea typeface="Lato"/>
+                <a:cs typeface="Lato"/>
+              </a:rPr>
+              <a:t>podem</a:t>
+            </a:r>
+            <a:r>
+              <a:rPr lang="en-US" sz="4000" spc="339" dirty="0">
+                <a:solidFill>
+                  <a:srgbClr val="000000"/>
+                </a:solidFill>
+                <a:latin typeface="Lato"/>
+                <a:ea typeface="Lato"/>
+                <a:cs typeface="Lato"/>
+              </a:rPr>
+              <a:t> mudar </a:t>
+            </a:r>
+            <a:r>
+              <a:rPr lang="en-US" sz="4000" spc="339" dirty="0" err="1">
+                <a:solidFill>
+                  <a:srgbClr val="000000"/>
+                </a:solidFill>
+                <a:latin typeface="Lato"/>
+                <a:ea typeface="Lato"/>
+                <a:cs typeface="Lato"/>
+              </a:rPr>
+              <a:t>dinamicamente</a:t>
+            </a:r>
+            <a:r>
+              <a:rPr lang="en-US" sz="4000" spc="339" dirty="0">
+                <a:solidFill>
+                  <a:srgbClr val="000000"/>
+                </a:solidFill>
+                <a:latin typeface="Lato"/>
+                <a:ea typeface="Lato"/>
+                <a:cs typeface="Lato"/>
+              </a:rPr>
+              <a:t> com base </a:t>
+            </a:r>
+            <a:r>
+              <a:rPr lang="en-US" sz="4000" spc="339" dirty="0" err="1">
+                <a:solidFill>
+                  <a:srgbClr val="000000"/>
+                </a:solidFill>
+                <a:latin typeface="Lato"/>
+                <a:ea typeface="Lato"/>
+                <a:cs typeface="Lato"/>
+              </a:rPr>
+              <a:t>em</a:t>
+            </a:r>
+            <a:r>
+              <a:rPr lang="en-US" sz="4000" spc="339" dirty="0">
+                <a:solidFill>
+                  <a:srgbClr val="000000"/>
+                </a:solidFill>
+                <a:latin typeface="Lato"/>
+                <a:ea typeface="Lato"/>
+                <a:cs typeface="Lato"/>
+              </a:rPr>
+              <a:t> </a:t>
+            </a:r>
+            <a:r>
+              <a:rPr lang="en-US" sz="4000" spc="339" dirty="0" err="1">
+                <a:solidFill>
+                  <a:srgbClr val="000000"/>
+                </a:solidFill>
+                <a:latin typeface="Lato"/>
+                <a:ea typeface="Lato"/>
+                <a:cs typeface="Lato"/>
+              </a:rPr>
+              <a:t>interações</a:t>
+            </a:r>
+            <a:r>
+              <a:rPr lang="en-US" sz="4000" spc="339" dirty="0">
+                <a:solidFill>
+                  <a:srgbClr val="000000"/>
+                </a:solidFill>
+                <a:latin typeface="Lato"/>
+                <a:ea typeface="Lato"/>
+                <a:cs typeface="Lato"/>
+              </a:rPr>
+              <a:t> do </a:t>
+            </a:r>
+            <a:r>
+              <a:rPr lang="en-US" sz="4000" spc="339" dirty="0" err="1">
+                <a:solidFill>
+                  <a:srgbClr val="000000"/>
+                </a:solidFill>
+                <a:latin typeface="Lato"/>
+                <a:ea typeface="Lato"/>
+                <a:cs typeface="Lato"/>
+              </a:rPr>
+              <a:t>usuário</a:t>
+            </a:r>
+            <a:r>
+              <a:rPr lang="en-US" sz="4000" spc="339" dirty="0">
+                <a:solidFill>
+                  <a:srgbClr val="000000"/>
+                </a:solidFill>
+                <a:latin typeface="Lato"/>
+                <a:ea typeface="Lato"/>
+                <a:cs typeface="Lato"/>
+              </a:rPr>
+              <a:t>. </a:t>
+            </a:r>
+            <a:r>
+              <a:rPr lang="en-US" sz="4000" spc="339" dirty="0" err="1">
+                <a:solidFill>
+                  <a:srgbClr val="000000"/>
+                </a:solidFill>
+                <a:latin typeface="Lato"/>
+                <a:ea typeface="Lato"/>
+                <a:cs typeface="Lato"/>
+              </a:rPr>
+              <a:t>Alguns</a:t>
+            </a:r>
+            <a:r>
+              <a:rPr lang="en-US" sz="4000" spc="339" dirty="0">
+                <a:solidFill>
+                  <a:srgbClr val="000000"/>
+                </a:solidFill>
+                <a:latin typeface="Lato"/>
+                <a:ea typeface="Lato"/>
+                <a:cs typeface="Lato"/>
+              </a:rPr>
+              <a:t> </a:t>
+            </a:r>
+            <a:r>
+              <a:rPr lang="en-US" sz="4000" spc="339" dirty="0" err="1">
+                <a:solidFill>
+                  <a:srgbClr val="000000"/>
+                </a:solidFill>
+                <a:latin typeface="Lato"/>
+                <a:ea typeface="Lato"/>
+                <a:cs typeface="Lato"/>
+              </a:rPr>
+              <a:t>exemplos</a:t>
+            </a:r>
+            <a:r>
+              <a:rPr lang="en-US" sz="4000" spc="339" dirty="0">
+                <a:solidFill>
+                  <a:srgbClr val="000000"/>
+                </a:solidFill>
+                <a:latin typeface="Lato"/>
+                <a:ea typeface="Lato"/>
+                <a:cs typeface="Lato"/>
+              </a:rPr>
+              <a:t> </a:t>
+            </a:r>
+            <a:r>
+              <a:rPr lang="en-US" sz="4000" spc="339" dirty="0" err="1">
+                <a:solidFill>
+                  <a:srgbClr val="000000"/>
+                </a:solidFill>
+                <a:latin typeface="Lato"/>
+                <a:ea typeface="Lato"/>
+                <a:cs typeface="Lato"/>
+              </a:rPr>
+              <a:t>são</a:t>
+            </a:r>
+            <a:r>
+              <a:rPr lang="en-US" sz="4000" spc="339" dirty="0">
+                <a:solidFill>
+                  <a:srgbClr val="000000"/>
+                </a:solidFill>
+                <a:latin typeface="Lato"/>
+                <a:ea typeface="Lato"/>
+                <a:cs typeface="Lato"/>
+              </a:rPr>
+              <a:t>: entrada e </a:t>
+            </a:r>
+            <a:r>
+              <a:rPr lang="en-US" sz="4000" spc="339" dirty="0" err="1">
+                <a:solidFill>
+                  <a:srgbClr val="000000"/>
+                </a:solidFill>
+                <a:latin typeface="Lato"/>
+                <a:ea typeface="Lato"/>
+                <a:cs typeface="Lato"/>
+              </a:rPr>
+              <a:t>manipulação</a:t>
+            </a:r>
+            <a:r>
+              <a:rPr lang="en-US" sz="4000" spc="339" dirty="0">
+                <a:solidFill>
+                  <a:srgbClr val="000000"/>
+                </a:solidFill>
+                <a:latin typeface="Lato"/>
+                <a:ea typeface="Lato"/>
+                <a:cs typeface="Lato"/>
+              </a:rPr>
+              <a:t> de dados, </a:t>
+            </a:r>
+            <a:r>
+              <a:rPr lang="en-US" sz="4000" spc="339" dirty="0" err="1">
+                <a:solidFill>
+                  <a:srgbClr val="000000"/>
+                </a:solidFill>
+                <a:latin typeface="Lato"/>
+                <a:ea typeface="Lato"/>
+                <a:cs typeface="Lato"/>
+              </a:rPr>
+              <a:t>botões</a:t>
+            </a:r>
+            <a:r>
+              <a:rPr lang="en-US" sz="4000" spc="339" dirty="0">
+                <a:solidFill>
+                  <a:srgbClr val="000000"/>
+                </a:solidFill>
+                <a:latin typeface="Lato"/>
+                <a:ea typeface="Lato"/>
+                <a:cs typeface="Lato"/>
+              </a:rPr>
+              <a:t> </a:t>
+            </a:r>
+            <a:r>
+              <a:rPr lang="en-US" sz="4000" spc="339" dirty="0" err="1">
+                <a:solidFill>
+                  <a:srgbClr val="000000"/>
+                </a:solidFill>
+                <a:latin typeface="Lato"/>
+                <a:ea typeface="Lato"/>
+                <a:cs typeface="Lato"/>
+              </a:rPr>
+              <a:t>interativos</a:t>
+            </a:r>
+            <a:r>
+              <a:rPr lang="en-US" sz="4000" spc="339" dirty="0">
+                <a:solidFill>
+                  <a:srgbClr val="000000"/>
+                </a:solidFill>
+                <a:latin typeface="Lato"/>
+                <a:ea typeface="Lato"/>
+                <a:cs typeface="Lato"/>
+              </a:rPr>
+              <a:t>, entre outros.</a:t>
             </a:r>
           </a:p>
         </p:txBody>
@@ -6748,52 +6725,6 @@
       </p:grpSp>
       <p:sp>
         <p:nvSpPr>
-          <p:cNvPr id="4" name="Freeform 4"/>
-          <p:cNvSpPr/>
-          <p:nvPr/>
-        </p:nvSpPr>
-        <p:spPr>
-          <a:xfrm>
-            <a:off x="8835414" y="3157279"/>
-            <a:ext cx="9355630" cy="4462301"/>
-          </a:xfrm>
-          <a:custGeom>
-            <a:avLst/>
-            <a:gdLst/>
-            <a:ahLst/>
-            <a:cxnLst/>
-            <a:rect l="l" t="t" r="r" b="b"/>
-            <a:pathLst>
-              <a:path w="9355630" h="4462301">
-                <a:moveTo>
-                  <a:pt x="0" y="0"/>
-                </a:moveTo>
-                <a:lnTo>
-                  <a:pt x="9355630" y="0"/>
-                </a:lnTo>
-                <a:lnTo>
-                  <a:pt x="9355630" y="4462301"/>
-                </a:lnTo>
-                <a:lnTo>
-                  <a:pt x="0" y="4462301"/>
-                </a:lnTo>
-                <a:lnTo>
-                  <a:pt x="0" y="0"/>
-                </a:lnTo>
-                <a:close/>
-              </a:path>
-            </a:pathLst>
-          </a:custGeom>
-          <a:blipFill>
-            <a:blip r:embed="rId2"/>
-            <a:stretch>
-              <a:fillRect l="-5235" t="-23017" r="-5067"/>
-            </a:stretch>
-          </a:blipFill>
-        </p:spPr>
-      </p:sp>
-      <p:sp>
-        <p:nvSpPr>
           <p:cNvPr id="5" name="TextBox 5"/>
           <p:cNvSpPr txBox="1"/>
           <p:nvPr/>
@@ -6838,15 +6769,15 @@
         </p:nvSpPr>
         <p:spPr>
           <a:xfrm>
-            <a:off x="-235324" y="1458984"/>
-            <a:ext cx="8770631" cy="8656216"/>
+            <a:off x="704127" y="1631217"/>
+            <a:ext cx="16881234" cy="6924973"/>
           </a:xfrm>
           <a:prstGeom prst="rect">
             <a:avLst/>
           </a:prstGeom>
         </p:spPr>
         <p:txBody>
-          <a:bodyPr lIns="0" tIns="0" rIns="0" bIns="0" rtlCol="0" anchor="t">
+          <a:bodyPr wrap="square" lIns="0" tIns="0" rIns="0" bIns="0" rtlCol="0" anchor="t">
             <a:spAutoFit/>
           </a:bodyPr>
           <a:lstStyle/>
@@ -6978,8 +6909,23 @@
               <a:buFont typeface="Arial"/>
               <a:buChar char="•"/>
             </a:pPr>
-            <a:r>
-              <a:rPr lang="en-US" sz="4000" spc="320" err="1">
+            <a:endParaRPr lang="en-US" sz="4000" spc="320" dirty="0">
+              <a:solidFill>
+                <a:srgbClr val="000000"/>
+              </a:solidFill>
+              <a:latin typeface="Lato"/>
+            </a:endParaRPr>
+          </a:p>
+          <a:p>
+            <a:pPr marL="690880" lvl="1" indent="-345440" algn="just">
+              <a:lnSpc>
+                <a:spcPts val="4480"/>
+              </a:lnSpc>
+              <a:buFont typeface="Arial"/>
+              <a:buChar char="•"/>
+            </a:pPr>
+            <a:r>
+              <a:rPr lang="en-US" sz="4000" spc="320" dirty="0" err="1">
                 <a:solidFill>
                   <a:srgbClr val="000000"/>
                 </a:solidFill>
@@ -6997,47 +6943,90 @@
               <a:t> Stateless Widgets </a:t>
             </a:r>
             <a:r>
-              <a:rPr lang="en-US" sz="4000" spc="320" err="1">
-                <a:solidFill>
-                  <a:srgbClr val="000000"/>
-                </a:solidFill>
-                <a:latin typeface="Lato"/>
-              </a:rPr>
-              <a:t>são</a:t>
-            </a:r>
-            <a:r>
-              <a:rPr lang="en-US" sz="4000" spc="320" dirty="0">
-                <a:solidFill>
-                  <a:srgbClr val="000000"/>
-                </a:solidFill>
-                <a:latin typeface="Lato"/>
+              <a:rPr lang="en-US" sz="4000" spc="320" dirty="0">
+                <a:solidFill>
+                  <a:srgbClr val="000000"/>
+                </a:solidFill>
+                <a:latin typeface="Lato"/>
+                <a:ea typeface="Lato"/>
+                <a:cs typeface="Lato"/>
+              </a:rPr>
+              <a:t>é </a:t>
+            </a:r>
+            <a:r>
+              <a:rPr lang="en-US" sz="4000" spc="320" dirty="0" err="1">
+                <a:solidFill>
+                  <a:srgbClr val="000000"/>
+                </a:solidFill>
+                <a:latin typeface="Lato"/>
+                <a:ea typeface="Lato"/>
+                <a:cs typeface="Lato"/>
+              </a:rPr>
+              <a:t>imutável</a:t>
+            </a:r>
+            <a:r>
+              <a:rPr lang="en-US" sz="4000" spc="320" dirty="0">
+                <a:solidFill>
+                  <a:srgbClr val="000000"/>
+                </a:solidFill>
+                <a:latin typeface="Lato"/>
+                <a:ea typeface="Lato"/>
+                <a:cs typeface="Lato"/>
+              </a:rPr>
+              <a:t>, </a:t>
+            </a:r>
+            <a:r>
+              <a:rPr lang="en-US" sz="4000" spc="320" dirty="0" err="1">
+                <a:solidFill>
+                  <a:srgbClr val="000000"/>
+                </a:solidFill>
+                <a:latin typeface="Lato"/>
+                <a:ea typeface="Lato"/>
+                <a:cs typeface="Lato"/>
+              </a:rPr>
+              <a:t>ou</a:t>
+            </a:r>
+            <a:r>
+              <a:rPr lang="en-US" sz="4000" spc="320" dirty="0">
+                <a:solidFill>
+                  <a:srgbClr val="000000"/>
+                </a:solidFill>
+                <a:latin typeface="Lato"/>
+                <a:ea typeface="Lato"/>
+                <a:cs typeface="Lato"/>
               </a:rPr>
               <a:t> </a:t>
             </a:r>
             <a:r>
-              <a:rPr lang="en-US" sz="4000" spc="320" err="1">
-                <a:solidFill>
-                  <a:srgbClr val="000000"/>
-                </a:solidFill>
-                <a:latin typeface="Lato"/>
-              </a:rPr>
-              <a:t>componentes</a:t>
-            </a:r>
-            <a:r>
-              <a:rPr lang="en-US" sz="4000" spc="320" dirty="0">
-                <a:solidFill>
-                  <a:srgbClr val="000000"/>
-                </a:solidFill>
-                <a:latin typeface="Lato"/>
-              </a:rPr>
-              <a:t> que </a:t>
-            </a:r>
-            <a:r>
-              <a:rPr lang="en-US" sz="4000" spc="320" err="1">
-                <a:solidFill>
-                  <a:srgbClr val="000000"/>
-                </a:solidFill>
-                <a:latin typeface="Lato"/>
+              <a:rPr lang="en-US" sz="4000" spc="320" dirty="0" err="1">
+                <a:solidFill>
+                  <a:srgbClr val="000000"/>
+                </a:solidFill>
+                <a:latin typeface="Lato"/>
+                <a:ea typeface="Lato"/>
+                <a:cs typeface="Lato"/>
+              </a:rPr>
+              <a:t>seja</a:t>
+            </a:r>
+            <a:r>
+              <a:rPr lang="en-US" sz="4000" spc="320" dirty="0">
+                <a:solidFill>
+                  <a:srgbClr val="000000"/>
+                </a:solidFill>
+                <a:latin typeface="Lato"/>
+                <a:ea typeface="Lato"/>
+                <a:cs typeface="Lato"/>
+              </a:rPr>
+              <a:t>, </a:t>
+            </a:r>
+            <a:r>
+              <a:rPr lang="en-US" sz="4000" spc="320" dirty="0" err="1">
+                <a:solidFill>
+                  <a:srgbClr val="000000"/>
+                </a:solidFill>
+                <a:latin typeface="Lato"/>
+                <a:ea typeface="Lato"/>
+                <a:cs typeface="Lato"/>
               </a:rPr>
               <a:t>não</a:t>
             </a:r>
@@ -7047,81 +7036,246 @@
                   <a:srgbClr val="000000"/>
                 </a:solidFill>
                 <a:latin typeface="Lato"/>
+                <a:ea typeface="Lato"/>
+                <a:cs typeface="Lato"/>
               </a:rPr>
               <a:t> </a:t>
             </a:r>
             <a:r>
-              <a:rPr lang="en-US" sz="4000" spc="320" err="1">
-                <a:solidFill>
-                  <a:srgbClr val="000000"/>
-                </a:solidFill>
-                <a:latin typeface="Lato"/>
-              </a:rPr>
-              <a:t>possuem</a:t>
-            </a:r>
-            <a:r>
-              <a:rPr lang="en-US" sz="4000" spc="320" dirty="0">
-                <a:solidFill>
-                  <a:srgbClr val="000000"/>
-                </a:solidFill>
-                <a:latin typeface="Lato"/>
+              <a:rPr lang="en-US" sz="4000" spc="320" dirty="0" err="1">
+                <a:solidFill>
+                  <a:srgbClr val="000000"/>
+                </a:solidFill>
+                <a:latin typeface="Lato"/>
+                <a:ea typeface="Lato"/>
+                <a:cs typeface="Lato"/>
+              </a:rPr>
+              <a:t>pode</a:t>
+            </a:r>
+            <a:r>
+              <a:rPr lang="en-US" sz="4000" spc="320" dirty="0">
+                <a:solidFill>
+                  <a:srgbClr val="000000"/>
+                </a:solidFill>
+                <a:latin typeface="Lato"/>
+                <a:ea typeface="Lato"/>
+                <a:cs typeface="Lato"/>
+              </a:rPr>
+              <a:t> ser </a:t>
+            </a:r>
+            <a:r>
+              <a:rPr lang="en-US" sz="4000" spc="320" dirty="0" err="1">
+                <a:solidFill>
+                  <a:srgbClr val="000000"/>
+                </a:solidFill>
+                <a:latin typeface="Lato"/>
+                <a:ea typeface="Lato"/>
+                <a:cs typeface="Lato"/>
+              </a:rPr>
+              <a:t>alterado</a:t>
+            </a:r>
+            <a:r>
+              <a:rPr lang="en-US" sz="4000" spc="320" dirty="0">
+                <a:solidFill>
+                  <a:srgbClr val="000000"/>
+                </a:solidFill>
+                <a:latin typeface="Lato"/>
+                <a:ea typeface="Lato"/>
+                <a:cs typeface="Lato"/>
               </a:rPr>
               <a:t> </a:t>
             </a:r>
             <a:r>
-              <a:rPr lang="en-US" sz="4000" spc="320" err="1">
-                <a:solidFill>
-                  <a:srgbClr val="000000"/>
-                </a:solidFill>
-                <a:latin typeface="Lato"/>
-              </a:rPr>
-              <a:t>alteração</a:t>
-            </a:r>
-            <a:r>
-              <a:rPr lang="en-US" sz="4000" spc="320" dirty="0">
-                <a:solidFill>
-                  <a:srgbClr val="000000"/>
-                </a:solidFill>
-                <a:latin typeface="Lato"/>
+              <a:rPr lang="en-US" sz="4000" spc="320" dirty="0" err="1">
+                <a:solidFill>
+                  <a:srgbClr val="000000"/>
+                </a:solidFill>
+                <a:latin typeface="Lato"/>
+                <a:ea typeface="Lato"/>
+                <a:cs typeface="Lato"/>
+              </a:rPr>
+              <a:t>após</a:t>
+            </a:r>
+            <a:r>
+              <a:rPr lang="en-US" sz="4000" spc="320" dirty="0">
+                <a:solidFill>
+                  <a:srgbClr val="000000"/>
+                </a:solidFill>
+                <a:latin typeface="Lato"/>
+                <a:ea typeface="Lato"/>
+                <a:cs typeface="Lato"/>
+              </a:rPr>
+              <a:t> ser </a:t>
+            </a:r>
+            <a:r>
+              <a:rPr lang="en-US" sz="4000" spc="320" dirty="0" err="1">
+                <a:solidFill>
+                  <a:srgbClr val="000000"/>
+                </a:solidFill>
+                <a:latin typeface="Lato"/>
+                <a:ea typeface="Lato"/>
+                <a:cs typeface="Lato"/>
+              </a:rPr>
+              <a:t>criado</a:t>
+            </a:r>
+            <a:r>
+              <a:rPr lang="en-US" sz="4000" spc="320" dirty="0">
+                <a:solidFill>
+                  <a:srgbClr val="000000"/>
+                </a:solidFill>
+                <a:latin typeface="Lato"/>
+                <a:ea typeface="Lato"/>
+                <a:cs typeface="Lato"/>
+              </a:rPr>
+              <a:t>. Ele é ideal para </a:t>
+            </a:r>
+            <a:r>
+              <a:rPr lang="en-US" sz="4000" spc="320" dirty="0" err="1">
+                <a:solidFill>
+                  <a:srgbClr val="000000"/>
+                </a:solidFill>
+                <a:latin typeface="Lato"/>
+                <a:ea typeface="Lato"/>
+                <a:cs typeface="Lato"/>
+              </a:rPr>
+              <a:t>elementos</a:t>
+            </a:r>
+            <a:r>
+              <a:rPr lang="en-US" sz="4000" spc="320" dirty="0">
+                <a:solidFill>
+                  <a:srgbClr val="000000"/>
+                </a:solidFill>
+                <a:latin typeface="Lato"/>
+                <a:ea typeface="Lato"/>
+                <a:cs typeface="Lato"/>
+              </a:rPr>
+              <a:t> da interface que </a:t>
+            </a:r>
+            <a:r>
+              <a:rPr lang="en-US" sz="4000" spc="320" dirty="0" err="1">
+                <a:solidFill>
+                  <a:srgbClr val="000000"/>
+                </a:solidFill>
+                <a:latin typeface="Lato"/>
+                <a:ea typeface="Lato"/>
+                <a:cs typeface="Lato"/>
+              </a:rPr>
+              <a:t>não</a:t>
+            </a:r>
+            <a:r>
+              <a:rPr lang="en-US" sz="4000" spc="320" dirty="0">
+                <a:solidFill>
+                  <a:srgbClr val="000000"/>
+                </a:solidFill>
+                <a:latin typeface="Lato"/>
+                <a:ea typeface="Lato"/>
+                <a:cs typeface="Lato"/>
               </a:rPr>
               <a:t> </a:t>
             </a:r>
             <a:r>
-              <a:rPr lang="en-US" sz="4000" spc="320" err="1">
-                <a:solidFill>
-                  <a:srgbClr val="000000"/>
-                </a:solidFill>
-                <a:latin typeface="Lato"/>
-              </a:rPr>
-              <a:t>após</a:t>
-            </a:r>
-            <a:r>
-              <a:rPr lang="en-US" sz="4000" spc="320" dirty="0">
-                <a:solidFill>
-                  <a:srgbClr val="000000"/>
-                </a:solidFill>
-                <a:latin typeface="Lato"/>
+              <a:rPr lang="en-US" sz="4000" spc="320" dirty="0" err="1">
+                <a:solidFill>
+                  <a:srgbClr val="000000"/>
+                </a:solidFill>
+                <a:latin typeface="Lato"/>
+                <a:ea typeface="Lato"/>
+                <a:cs typeface="Lato"/>
+              </a:rPr>
+              <a:t>precisam</a:t>
+            </a:r>
+            <a:r>
+              <a:rPr lang="en-US" sz="4000" spc="320" dirty="0">
+                <a:solidFill>
+                  <a:srgbClr val="000000"/>
+                </a:solidFill>
+                <a:latin typeface="Lato"/>
+                <a:ea typeface="Lato"/>
+                <a:cs typeface="Lato"/>
+              </a:rPr>
+              <a:t> mudar de </a:t>
+            </a:r>
+            <a:r>
+              <a:rPr lang="en-US" sz="4000" spc="320" dirty="0" err="1">
+                <a:solidFill>
+                  <a:srgbClr val="000000"/>
+                </a:solidFill>
+                <a:latin typeface="Lato"/>
+                <a:ea typeface="Lato"/>
+                <a:cs typeface="Lato"/>
+              </a:rPr>
+              <a:t>estado</a:t>
+            </a:r>
+            <a:r>
+              <a:rPr lang="en-US" sz="4000" spc="320" dirty="0">
+                <a:solidFill>
+                  <a:srgbClr val="000000"/>
+                </a:solidFill>
+                <a:latin typeface="Lato"/>
+                <a:ea typeface="Lato"/>
+                <a:cs typeface="Lato"/>
               </a:rPr>
               <a:t> </a:t>
             </a:r>
             <a:r>
-              <a:rPr lang="en-US" sz="4000" spc="320" err="1">
-                <a:solidFill>
-                  <a:srgbClr val="000000"/>
-                </a:solidFill>
-                <a:latin typeface="Lato"/>
-              </a:rPr>
-              <a:t>renderizado</a:t>
-            </a:r>
-            <a:r>
-              <a:rPr lang="en-US" sz="4000" spc="320" dirty="0">
-                <a:solidFill>
-                  <a:srgbClr val="000000"/>
-                </a:solidFill>
-                <a:latin typeface="Lato"/>
+              <a:rPr lang="en-US" sz="4000" spc="320" dirty="0" err="1">
+                <a:solidFill>
+                  <a:srgbClr val="000000"/>
+                </a:solidFill>
+                <a:latin typeface="Lato"/>
+                <a:ea typeface="Lato"/>
+                <a:cs typeface="Lato"/>
+              </a:rPr>
+              <a:t>ou</a:t>
+            </a:r>
+            <a:r>
+              <a:rPr lang="en-US" sz="4000" spc="320" dirty="0">
+                <a:solidFill>
+                  <a:srgbClr val="000000"/>
+                </a:solidFill>
+                <a:latin typeface="Lato"/>
+                <a:ea typeface="Lato"/>
+                <a:cs typeface="Lato"/>
+              </a:rPr>
+              <a:t> dados </a:t>
+            </a:r>
+            <a:r>
+              <a:rPr lang="en-US" sz="4000" spc="320" dirty="0" err="1">
+                <a:solidFill>
+                  <a:srgbClr val="000000"/>
+                </a:solidFill>
+                <a:latin typeface="Lato"/>
+                <a:ea typeface="Lato"/>
+                <a:cs typeface="Lato"/>
+              </a:rPr>
+              <a:t>dinâmicos</a:t>
+            </a:r>
+            <a:r>
+              <a:rPr lang="en-US" sz="4000" spc="320" dirty="0">
+                <a:solidFill>
+                  <a:srgbClr val="000000"/>
+                </a:solidFill>
+                <a:latin typeface="Lato"/>
+                <a:ea typeface="Lato"/>
+                <a:cs typeface="Lato"/>
               </a:rPr>
               <a:t>;</a:t>
             </a:r>
+            <a:endParaRPr lang="en-US" sz="4000" spc="320" dirty="0">
+              <a:solidFill>
+                <a:srgbClr val="000000"/>
+              </a:solidFill>
+              <a:latin typeface="Lato"/>
+            </a:endParaRPr>
+          </a:p>
+          <a:p>
+            <a:pPr marL="690880" lvl="1" indent="-345440" algn="just">
+              <a:lnSpc>
+                <a:spcPts val="4480"/>
+              </a:lnSpc>
+              <a:buFont typeface="Arial"/>
+              <a:buChar char="•"/>
+            </a:pPr>
             <a:endParaRPr lang="en-US" sz="4000" spc="320" dirty="0">
               <a:solidFill>
                 <a:srgbClr val="000000"/>
@@ -7145,8 +7299,10 @@
                   <a:srgbClr val="000000"/>
                 </a:solidFill>
                 <a:latin typeface="Lato"/>
-              </a:rPr>
-              <a:t>No </a:t>
+                <a:ea typeface="Lato"/>
+                <a:cs typeface="Lato"/>
+              </a:rPr>
+              <a:t>Eles </a:t>
             </a:r>
             <a:r>
               <a:rPr lang="en-US" sz="4000" spc="320" err="1">
@@ -7154,15 +7310,19 @@
                   <a:srgbClr val="000000"/>
                 </a:solidFill>
                 <a:latin typeface="Lato"/>
-              </a:rPr>
-              <a:t>exemplo</a:t>
-            </a:r>
-            <a:r>
-              <a:rPr lang="en-US" sz="4000" spc="320" dirty="0">
-                <a:solidFill>
-                  <a:srgbClr val="000000"/>
-                </a:solidFill>
-                <a:latin typeface="Lato"/>
+                <a:ea typeface="Lato"/>
+                <a:cs typeface="Lato"/>
+              </a:rPr>
+              <a:t>são</a:t>
+            </a:r>
+            <a:r>
+              <a:rPr lang="en-US" sz="4000" spc="320" dirty="0">
+                <a:solidFill>
+                  <a:srgbClr val="000000"/>
+                </a:solidFill>
+                <a:latin typeface="Lato"/>
+                <a:ea typeface="Lato"/>
+                <a:cs typeface="Lato"/>
               </a:rPr>
               <a:t> </a:t>
             </a:r>
@@ -7172,6 +7332,404 @@
                   <a:srgbClr val="000000"/>
                 </a:solidFill>
                 <a:latin typeface="Lato"/>
+                <a:ea typeface="Lato"/>
+                <a:cs typeface="Lato"/>
+              </a:rPr>
+              <a:t>amplamente</a:t>
+            </a:r>
+            <a:r>
+              <a:rPr lang="en-US" sz="4000" spc="320" dirty="0">
+                <a:solidFill>
+                  <a:srgbClr val="000000"/>
+                </a:solidFill>
+                <a:latin typeface="Lato"/>
+                <a:ea typeface="Lato"/>
+                <a:cs typeface="Lato"/>
+              </a:rPr>
+              <a:t> </a:t>
+            </a:r>
+            <a:r>
+              <a:rPr lang="en-US" sz="4000" spc="320" err="1">
+                <a:solidFill>
+                  <a:srgbClr val="000000"/>
+                </a:solidFill>
+                <a:latin typeface="Lato"/>
+                <a:ea typeface="Lato"/>
+                <a:cs typeface="Lato"/>
+              </a:rPr>
+              <a:t>utilizados</a:t>
+            </a:r>
+            <a:r>
+              <a:rPr lang="en-US" sz="4000" spc="320" dirty="0">
+                <a:solidFill>
+                  <a:srgbClr val="000000"/>
+                </a:solidFill>
+                <a:latin typeface="Lato"/>
+                <a:ea typeface="Lato"/>
+                <a:cs typeface="Lato"/>
+              </a:rPr>
+              <a:t> para a </a:t>
+            </a:r>
+            <a:r>
+              <a:rPr lang="en-US" sz="4000" spc="320" err="1">
+                <a:solidFill>
+                  <a:srgbClr val="000000"/>
+                </a:solidFill>
+                <a:latin typeface="Lato"/>
+                <a:ea typeface="Lato"/>
+                <a:cs typeface="Lato"/>
+              </a:rPr>
+              <a:t>criação</a:t>
+            </a:r>
+            <a:r>
+              <a:rPr lang="en-US" sz="4000" spc="320" dirty="0">
+                <a:solidFill>
+                  <a:srgbClr val="000000"/>
+                </a:solidFill>
+                <a:latin typeface="Lato"/>
+                <a:ea typeface="Lato"/>
+                <a:cs typeface="Lato"/>
+              </a:rPr>
+              <a:t> de </a:t>
+            </a:r>
+            <a:r>
+              <a:rPr lang="en-US" sz="4000" spc="320" err="1">
+                <a:solidFill>
+                  <a:srgbClr val="000000"/>
+                </a:solidFill>
+                <a:latin typeface="Lato"/>
+                <a:ea typeface="Lato"/>
+                <a:cs typeface="Lato"/>
+              </a:rPr>
+              <a:t>estruturas</a:t>
+            </a:r>
+            <a:r>
+              <a:rPr lang="en-US" sz="4000" spc="320" dirty="0">
+                <a:solidFill>
+                  <a:srgbClr val="000000"/>
+                </a:solidFill>
+                <a:latin typeface="Lato"/>
+                <a:ea typeface="Lato"/>
+                <a:cs typeface="Lato"/>
+              </a:rPr>
+              <a:t> </a:t>
+            </a:r>
+            <a:r>
+              <a:rPr lang="en-US" sz="4000" spc="320" err="1">
+                <a:solidFill>
+                  <a:srgbClr val="000000"/>
+                </a:solidFill>
+                <a:latin typeface="Lato"/>
+                <a:ea typeface="Lato"/>
+                <a:cs typeface="Lato"/>
+              </a:rPr>
+              <a:t>não</a:t>
+            </a:r>
+            <a:r>
+              <a:rPr lang="en-US" sz="4000" spc="320" dirty="0">
+                <a:solidFill>
+                  <a:srgbClr val="000000"/>
+                </a:solidFill>
+                <a:latin typeface="Lato"/>
+                <a:ea typeface="Lato"/>
+                <a:cs typeface="Lato"/>
+              </a:rPr>
+              <a:t> </a:t>
+            </a:r>
+            <a:r>
+              <a:rPr lang="en-US" sz="4000" spc="320" err="1">
+                <a:solidFill>
+                  <a:srgbClr val="000000"/>
+                </a:solidFill>
+                <a:latin typeface="Lato"/>
+                <a:ea typeface="Lato"/>
+                <a:cs typeface="Lato"/>
+              </a:rPr>
+              <a:t>mutáveis</a:t>
+            </a:r>
+            <a:r>
+              <a:rPr lang="en-US" sz="4000" spc="320" dirty="0">
+                <a:solidFill>
+                  <a:srgbClr val="000000"/>
+                </a:solidFill>
+                <a:latin typeface="Lato"/>
+                <a:ea typeface="Lato"/>
+                <a:cs typeface="Lato"/>
+              </a:rPr>
+              <a:t> </a:t>
+            </a:r>
+            <a:r>
+              <a:rPr lang="en-US" sz="4000" spc="320" err="1">
+                <a:solidFill>
+                  <a:srgbClr val="000000"/>
+                </a:solidFill>
+                <a:latin typeface="Lato"/>
+                <a:ea typeface="Lato"/>
+                <a:cs typeface="Lato"/>
+              </a:rPr>
+              <a:t>nos</a:t>
+            </a:r>
+            <a:r>
+              <a:rPr lang="en-US" sz="4000" spc="320" dirty="0">
+                <a:solidFill>
+                  <a:srgbClr val="000000"/>
+                </a:solidFill>
+                <a:latin typeface="Lato"/>
+                <a:ea typeface="Lato"/>
+                <a:cs typeface="Lato"/>
+              </a:rPr>
+              <a:t> </a:t>
+            </a:r>
+            <a:r>
+              <a:rPr lang="en-US" sz="4000" spc="320" err="1">
+                <a:solidFill>
+                  <a:srgbClr val="000000"/>
+                </a:solidFill>
+                <a:latin typeface="Lato"/>
+                <a:ea typeface="Lato"/>
+                <a:cs typeface="Lato"/>
+              </a:rPr>
+              <a:t>aplicativos</a:t>
+            </a:r>
+            <a:r>
+              <a:rPr lang="en-US" sz="4000" spc="320" dirty="0">
+                <a:solidFill>
+                  <a:srgbClr val="000000"/>
+                </a:solidFill>
+                <a:latin typeface="Lato"/>
+                <a:ea typeface="Lato"/>
+                <a:cs typeface="Lato"/>
+              </a:rPr>
+              <a:t> (</a:t>
+            </a:r>
+            <a:r>
+              <a:rPr lang="en-US" sz="4000" spc="320" err="1">
+                <a:solidFill>
+                  <a:srgbClr val="000000"/>
+                </a:solidFill>
+                <a:latin typeface="Lato"/>
+                <a:ea typeface="Lato"/>
+                <a:cs typeface="Lato"/>
+              </a:rPr>
+              <a:t>telas</a:t>
+            </a:r>
+            <a:r>
+              <a:rPr lang="en-US" sz="4000" spc="320" dirty="0">
+                <a:solidFill>
+                  <a:srgbClr val="000000"/>
+                </a:solidFill>
+                <a:latin typeface="Lato"/>
+                <a:ea typeface="Lato"/>
+                <a:cs typeface="Lato"/>
+              </a:rPr>
+              <a:t>, menus, imagens etc.), </a:t>
+            </a:r>
+            <a:r>
+              <a:rPr lang="en-US" sz="4000" spc="320" err="1">
+                <a:solidFill>
+                  <a:srgbClr val="000000"/>
+                </a:solidFill>
+                <a:latin typeface="Lato"/>
+                <a:ea typeface="Lato"/>
+                <a:cs typeface="Lato"/>
+              </a:rPr>
+              <a:t>ou</a:t>
+            </a:r>
+            <a:r>
+              <a:rPr lang="en-US" sz="4000" spc="320" dirty="0">
+                <a:solidFill>
+                  <a:srgbClr val="000000"/>
+                </a:solidFill>
+                <a:latin typeface="Lato"/>
+                <a:ea typeface="Lato"/>
+                <a:cs typeface="Lato"/>
+              </a:rPr>
+              <a:t> </a:t>
+            </a:r>
+            <a:r>
+              <a:rPr lang="en-US" sz="4000" spc="320" err="1">
+                <a:solidFill>
+                  <a:srgbClr val="000000"/>
+                </a:solidFill>
+                <a:latin typeface="Lato"/>
+                <a:ea typeface="Lato"/>
+                <a:cs typeface="Lato"/>
+              </a:rPr>
+              <a:t>seja</a:t>
+            </a:r>
+            <a:r>
+              <a:rPr lang="en-US" sz="4000" spc="320" dirty="0">
+                <a:solidFill>
+                  <a:srgbClr val="000000"/>
+                </a:solidFill>
+                <a:latin typeface="Lato"/>
+                <a:ea typeface="Lato"/>
+                <a:cs typeface="Lato"/>
+              </a:rPr>
+              <a:t>, </a:t>
+            </a:r>
+            <a:r>
+              <a:rPr lang="en-US" sz="4000" spc="320" err="1">
+                <a:solidFill>
+                  <a:srgbClr val="000000"/>
+                </a:solidFill>
+                <a:latin typeface="Lato"/>
+                <a:ea typeface="Lato"/>
+                <a:cs typeface="Lato"/>
+              </a:rPr>
+              <a:t>tudo</a:t>
+            </a:r>
+            <a:r>
+              <a:rPr lang="en-US" sz="4000" spc="320" dirty="0">
+                <a:solidFill>
+                  <a:srgbClr val="000000"/>
+                </a:solidFill>
+                <a:latin typeface="Lato"/>
+                <a:ea typeface="Lato"/>
+                <a:cs typeface="Lato"/>
+              </a:rPr>
+              <a:t> que </a:t>
+            </a:r>
+            <a:r>
+              <a:rPr lang="en-US" sz="4000" spc="320" err="1">
+                <a:solidFill>
+                  <a:srgbClr val="000000"/>
+                </a:solidFill>
+                <a:latin typeface="Lato"/>
+                <a:ea typeface="Lato"/>
+                <a:cs typeface="Lato"/>
+              </a:rPr>
+              <a:t>não</a:t>
+            </a:r>
+            <a:r>
+              <a:rPr lang="en-US" sz="4000" spc="320" dirty="0">
+                <a:solidFill>
+                  <a:srgbClr val="000000"/>
+                </a:solidFill>
+                <a:latin typeface="Lato"/>
+                <a:ea typeface="Lato"/>
+                <a:cs typeface="Lato"/>
+              </a:rPr>
+              <a:t> </a:t>
+            </a:r>
+            <a:r>
+              <a:rPr lang="en-US" sz="4000" spc="320" err="1">
+                <a:solidFill>
+                  <a:srgbClr val="000000"/>
+                </a:solidFill>
+                <a:latin typeface="Lato"/>
+                <a:ea typeface="Lato"/>
+                <a:cs typeface="Lato"/>
+              </a:rPr>
+              <a:t>envolva</a:t>
+            </a:r>
+            <a:r>
+              <a:rPr lang="en-US" sz="4000" spc="320" dirty="0">
+                <a:solidFill>
+                  <a:srgbClr val="000000"/>
+                </a:solidFill>
+                <a:latin typeface="Lato"/>
+                <a:ea typeface="Lato"/>
+                <a:cs typeface="Lato"/>
+              </a:rPr>
+              <a:t> entradas de dados dos </a:t>
+            </a:r>
+            <a:r>
+              <a:rPr lang="en-US" sz="4000" spc="320" err="1">
+                <a:solidFill>
+                  <a:srgbClr val="000000"/>
+                </a:solidFill>
+                <a:latin typeface="Lato"/>
+                <a:ea typeface="Lato"/>
+                <a:cs typeface="Lato"/>
+              </a:rPr>
+              <a:t>usuários</a:t>
+            </a:r>
+            <a:r>
+              <a:rPr lang="en-US" sz="4000" spc="320" dirty="0">
+                <a:solidFill>
+                  <a:srgbClr val="000000"/>
+                </a:solidFill>
+                <a:latin typeface="Lato"/>
+                <a:ea typeface="Lato"/>
+                <a:cs typeface="Lato"/>
+              </a:rPr>
+              <a:t>, </a:t>
+            </a:r>
+            <a:r>
+              <a:rPr lang="en-US" sz="4000" spc="320" err="1">
+                <a:solidFill>
+                  <a:srgbClr val="000000"/>
+                </a:solidFill>
+                <a:latin typeface="Lato"/>
+                <a:ea typeface="Lato"/>
+                <a:cs typeface="Lato"/>
+              </a:rPr>
+              <a:t>acessos</a:t>
+            </a:r>
+            <a:r>
+              <a:rPr lang="en-US" sz="4000" spc="320" dirty="0">
+                <a:solidFill>
+                  <a:srgbClr val="000000"/>
+                </a:solidFill>
+                <a:latin typeface="Lato"/>
+                <a:ea typeface="Lato"/>
+                <a:cs typeface="Lato"/>
+              </a:rPr>
+              <a:t> a APIs e </a:t>
+            </a:r>
+            <a:r>
+              <a:rPr lang="en-US" sz="4000" spc="320" err="1">
+                <a:solidFill>
+                  <a:srgbClr val="000000"/>
+                </a:solidFill>
+                <a:latin typeface="Lato"/>
+                <a:ea typeface="Lato"/>
+                <a:cs typeface="Lato"/>
+              </a:rPr>
+              <a:t>coisas</a:t>
+            </a:r>
+            <a:r>
+              <a:rPr lang="en-US" sz="4000" spc="320" dirty="0">
+                <a:solidFill>
+                  <a:srgbClr val="000000"/>
+                </a:solidFill>
+                <a:latin typeface="Lato"/>
+                <a:ea typeface="Lato"/>
+                <a:cs typeface="Lato"/>
+              </a:rPr>
+              <a:t> que </a:t>
+            </a:r>
+            <a:r>
+              <a:rPr lang="en-US" sz="4000" spc="320" err="1">
+                <a:solidFill>
+                  <a:srgbClr val="000000"/>
+                </a:solidFill>
+                <a:latin typeface="Lato"/>
+                <a:ea typeface="Lato"/>
+                <a:cs typeface="Lato"/>
+              </a:rPr>
+              <a:t>mudem</a:t>
+            </a:r>
+            <a:r>
+              <a:rPr lang="en-US" sz="4000" spc="320" dirty="0">
+                <a:solidFill>
+                  <a:srgbClr val="000000"/>
+                </a:solidFill>
+                <a:latin typeface="Lato"/>
+                <a:ea typeface="Lato"/>
+                <a:cs typeface="Lato"/>
+              </a:rPr>
+              <a:t> </a:t>
+            </a:r>
+            <a:r>
+              <a:rPr lang="en-US" sz="4000" spc="320" err="1">
+                <a:solidFill>
+                  <a:srgbClr val="000000"/>
+                </a:solidFill>
+                <a:latin typeface="Lato"/>
+                <a:ea typeface="Lato"/>
+                <a:cs typeface="Lato"/>
               </a:rPr>
               <a:t>ao</a:t>
             </a:r>
@@ -7181,6 +7739,8 @@
                   <a:srgbClr val="000000"/>
                 </a:solidFill>
                 <a:latin typeface="Lato"/>
+                <a:ea typeface="Lato"/>
+                <a:cs typeface="Lato"/>
               </a:rPr>
               <a:t> </a:t>
             </a:r>
@@ -7190,17 +7750,21 @@
                   <a:srgbClr val="000000"/>
                 </a:solidFill>
                 <a:latin typeface="Lato"/>
-              </a:rPr>
-              <a:t>lado</a:t>
-            </a:r>
-            <a:r>
-              <a:rPr lang="en-US" sz="4000" spc="320" dirty="0">
-                <a:solidFill>
-                  <a:srgbClr val="000000"/>
-                </a:solidFill>
-                <a:latin typeface="Lato"/>
-              </a:rPr>
-              <a:t>, a </a:t>
+                <a:ea typeface="Lato"/>
+                <a:cs typeface="Lato"/>
+              </a:rPr>
+              <a:t>longo</a:t>
+            </a:r>
+            <a:r>
+              <a:rPr lang="en-US" sz="4000" spc="320" dirty="0">
+                <a:solidFill>
+                  <a:srgbClr val="000000"/>
+                </a:solidFill>
+                <a:latin typeface="Lato"/>
+                <a:ea typeface="Lato"/>
+                <a:cs typeface="Lato"/>
+              </a:rPr>
+              <a:t> do </a:t>
             </a:r>
             <a:r>
               <a:rPr lang="en-US" sz="4000" spc="320" err="1">
@@ -7208,518 +7772,19 @@
                   <a:srgbClr val="000000"/>
                 </a:solidFill>
                 <a:latin typeface="Lato"/>
-              </a:rPr>
-              <a:t>terceira</a:t>
-            </a:r>
-            <a:r>
-              <a:rPr lang="en-US" sz="4000" spc="320" dirty="0">
-                <a:solidFill>
-                  <a:srgbClr val="000000"/>
-                </a:solidFill>
-                <a:latin typeface="Lato"/>
-              </a:rPr>
-              <a:t> </a:t>
-            </a:r>
-            <a:r>
-              <a:rPr lang="en-US" sz="4000" spc="320" err="1">
-                <a:solidFill>
-                  <a:srgbClr val="000000"/>
-                </a:solidFill>
-                <a:latin typeface="Lato"/>
-              </a:rPr>
-              <a:t>imagem</a:t>
-            </a:r>
-            <a:r>
-              <a:rPr lang="en-US" sz="4000" spc="320" dirty="0">
-                <a:solidFill>
-                  <a:srgbClr val="000000"/>
-                </a:solidFill>
-                <a:latin typeface="Lato"/>
-              </a:rPr>
-              <a:t> </a:t>
-            </a:r>
-            <a:r>
-              <a:rPr lang="en-US" sz="4000" spc="320" err="1">
-                <a:solidFill>
-                  <a:srgbClr val="000000"/>
-                </a:solidFill>
-                <a:latin typeface="Lato"/>
-              </a:rPr>
-              <a:t>apresenta</a:t>
-            </a:r>
-            <a:r>
-              <a:rPr lang="en-US" sz="4000" spc="320" dirty="0">
-                <a:solidFill>
-                  <a:srgbClr val="000000"/>
-                </a:solidFill>
-                <a:latin typeface="Lato"/>
-              </a:rPr>
-              <a:t> o que </a:t>
-            </a:r>
-            <a:r>
-              <a:rPr lang="en-US" sz="4000" spc="320" err="1">
-                <a:solidFill>
-                  <a:srgbClr val="000000"/>
-                </a:solidFill>
-                <a:latin typeface="Lato"/>
-              </a:rPr>
-              <a:t>ocorre</a:t>
-            </a:r>
-            <a:r>
-              <a:rPr lang="en-US" sz="4000" spc="320" dirty="0">
-                <a:solidFill>
-                  <a:srgbClr val="000000"/>
-                </a:solidFill>
-                <a:latin typeface="Lato"/>
-              </a:rPr>
-              <a:t> </a:t>
-            </a:r>
-            <a:r>
-              <a:rPr lang="en-US" sz="4000" spc="320" err="1">
-                <a:solidFill>
-                  <a:srgbClr val="000000"/>
-                </a:solidFill>
-                <a:latin typeface="Lato"/>
-              </a:rPr>
-              <a:t>ao</a:t>
-            </a:r>
-            <a:r>
-              <a:rPr lang="en-US" sz="4000" spc="320" dirty="0">
-                <a:solidFill>
-                  <a:srgbClr val="000000"/>
-                </a:solidFill>
-                <a:latin typeface="Lato"/>
-              </a:rPr>
-              <a:t> </a:t>
-            </a:r>
-            <a:r>
-              <a:rPr lang="en-US" sz="4000" spc="320" err="1">
-                <a:solidFill>
-                  <a:srgbClr val="000000"/>
-                </a:solidFill>
-                <a:latin typeface="Lato"/>
-              </a:rPr>
-              <a:t>clicar</a:t>
-            </a:r>
-            <a:r>
-              <a:rPr lang="en-US" sz="4000" spc="320" dirty="0">
-                <a:solidFill>
-                  <a:srgbClr val="000000"/>
-                </a:solidFill>
-                <a:latin typeface="Lato"/>
-              </a:rPr>
-              <a:t> </a:t>
-            </a:r>
-            <a:r>
-              <a:rPr lang="en-US" sz="4000" spc="320" err="1">
-                <a:solidFill>
-                  <a:srgbClr val="000000"/>
-                </a:solidFill>
-                <a:latin typeface="Lato"/>
-              </a:rPr>
-              <a:t>em</a:t>
-            </a:r>
-            <a:r>
-              <a:rPr lang="en-US" sz="4000" spc="320" dirty="0">
-                <a:solidFill>
-                  <a:srgbClr val="000000"/>
-                </a:solidFill>
-                <a:latin typeface="Lato"/>
-              </a:rPr>
-              <a:t> </a:t>
-            </a:r>
-            <a:r>
-              <a:rPr lang="en-US" sz="4000" spc="320" err="1">
-                <a:solidFill>
-                  <a:srgbClr val="000000"/>
-                </a:solidFill>
-                <a:latin typeface="Lato"/>
-              </a:rPr>
-              <a:t>algum</a:t>
-            </a:r>
-            <a:r>
-              <a:rPr lang="en-US" sz="4000" spc="320" dirty="0">
-                <a:solidFill>
-                  <a:srgbClr val="000000"/>
-                </a:solidFill>
-                <a:latin typeface="Lato"/>
-              </a:rPr>
-              <a:t> </a:t>
-            </a:r>
-            <a:r>
-              <a:rPr lang="en-US" sz="4000" spc="320" err="1">
-                <a:solidFill>
-                  <a:srgbClr val="000000"/>
-                </a:solidFill>
-                <a:latin typeface="Lato"/>
-              </a:rPr>
-              <a:t>arquivo</a:t>
-            </a:r>
-            <a:r>
-              <a:rPr lang="en-US" sz="4000" spc="320" dirty="0">
-                <a:solidFill>
-                  <a:srgbClr val="000000"/>
-                </a:solidFill>
-                <a:latin typeface="Lato"/>
-              </a:rPr>
-              <a:t> </a:t>
-            </a:r>
-            <a:r>
-              <a:rPr lang="en-US" sz="4000" spc="320" err="1">
-                <a:solidFill>
-                  <a:srgbClr val="000000"/>
-                </a:solidFill>
-                <a:latin typeface="Lato"/>
-              </a:rPr>
-              <a:t>contido</a:t>
-            </a:r>
-            <a:r>
-              <a:rPr lang="en-US" sz="4000" spc="320" dirty="0">
-                <a:solidFill>
-                  <a:srgbClr val="000000"/>
-                </a:solidFill>
-                <a:latin typeface="Lato"/>
-              </a:rPr>
-              <a:t> </a:t>
-            </a:r>
-            <a:r>
-              <a:rPr lang="en-US" sz="4000" spc="320" err="1">
-                <a:solidFill>
-                  <a:srgbClr val="000000"/>
-                </a:solidFill>
-                <a:latin typeface="Lato"/>
-              </a:rPr>
-              <a:t>nos</a:t>
-            </a:r>
-            <a:r>
-              <a:rPr lang="en-US" sz="4000" spc="320" dirty="0">
-                <a:solidFill>
-                  <a:srgbClr val="000000"/>
-                </a:solidFill>
-                <a:latin typeface="Lato"/>
-              </a:rPr>
-              <a:t> </a:t>
-            </a:r>
-            <a:r>
-              <a:rPr lang="en-US" sz="4000" spc="320" err="1">
-                <a:solidFill>
-                  <a:srgbClr val="000000"/>
-                </a:solidFill>
-                <a:latin typeface="Lato"/>
-              </a:rPr>
-              <a:t>componentes</a:t>
-            </a:r>
-            <a:r>
-              <a:rPr lang="en-US" sz="4000" spc="320" dirty="0">
-                <a:solidFill>
-                  <a:srgbClr val="000000"/>
-                </a:solidFill>
-                <a:latin typeface="Lato"/>
-              </a:rPr>
-              <a:t>; </a:t>
-            </a:r>
-            <a:endParaRPr lang="en-US" sz="4000" spc="320" dirty="0">
-              <a:solidFill>
-                <a:srgbClr val="000000"/>
-              </a:solidFill>
-              <a:latin typeface="Lato"/>
-              <a:ea typeface="Lato"/>
-              <a:cs typeface="Lato"/>
-            </a:endParaRPr>
-          </a:p>
-          <a:p>
-            <a:pPr marL="690880" lvl="1" indent="-345440" algn="just">
-              <a:lnSpc>
-                <a:spcPts val="4480"/>
-              </a:lnSpc>
-              <a:buFont typeface="Arial"/>
-              <a:buChar char="•"/>
-            </a:pPr>
-            <a:r>
-              <a:rPr lang="en-US" sz="4000" spc="320" dirty="0">
-                <a:solidFill>
-                  <a:srgbClr val="000000"/>
-                </a:solidFill>
-                <a:latin typeface="Lato"/>
-              </a:rPr>
-              <a:t>O </a:t>
-            </a:r>
-            <a:r>
-              <a:rPr lang="en-US" sz="4000" spc="320" err="1">
-                <a:solidFill>
-                  <a:srgbClr val="000000"/>
-                </a:solidFill>
-                <a:latin typeface="Lato"/>
-              </a:rPr>
-              <a:t>passo</a:t>
-            </a:r>
-            <a:r>
-              <a:rPr lang="en-US" sz="4000" spc="320" dirty="0">
-                <a:solidFill>
-                  <a:srgbClr val="000000"/>
-                </a:solidFill>
-                <a:latin typeface="Lato"/>
-              </a:rPr>
-              <a:t> </a:t>
-            </a:r>
-            <a:r>
-              <a:rPr lang="en-US" sz="4000" spc="320" err="1">
-                <a:solidFill>
-                  <a:srgbClr val="000000"/>
-                </a:solidFill>
-                <a:latin typeface="Lato"/>
-              </a:rPr>
-              <a:t>seguinte</a:t>
-            </a:r>
-            <a:r>
-              <a:rPr lang="en-US" sz="4000" spc="320" dirty="0">
-                <a:solidFill>
-                  <a:srgbClr val="000000"/>
-                </a:solidFill>
-                <a:latin typeface="Lato"/>
-              </a:rPr>
-              <a:t> é </a:t>
-            </a:r>
-            <a:r>
-              <a:rPr lang="en-US" sz="4000" spc="320" err="1">
-                <a:solidFill>
-                  <a:srgbClr val="000000"/>
-                </a:solidFill>
-                <a:latin typeface="Lato"/>
-              </a:rPr>
-              <a:t>exibir</a:t>
-            </a:r>
-            <a:r>
-              <a:rPr lang="en-US" sz="4000" spc="320" dirty="0">
-                <a:solidFill>
-                  <a:srgbClr val="000000"/>
-                </a:solidFill>
-                <a:latin typeface="Lato"/>
-              </a:rPr>
-              <a:t> </a:t>
-            </a:r>
-            <a:r>
-              <a:rPr lang="en-US" sz="4000" spc="320" err="1">
-                <a:solidFill>
-                  <a:srgbClr val="000000"/>
-                </a:solidFill>
-                <a:latin typeface="Lato"/>
-              </a:rPr>
-              <a:t>uma</a:t>
-            </a:r>
-            <a:r>
-              <a:rPr lang="en-US" sz="4000" spc="320" dirty="0">
-                <a:solidFill>
-                  <a:srgbClr val="000000"/>
-                </a:solidFill>
-                <a:latin typeface="Lato"/>
-              </a:rPr>
-              <a:t> nova </a:t>
-            </a:r>
-            <a:r>
-              <a:rPr lang="en-US" sz="4000" spc="320" err="1">
-                <a:solidFill>
-                  <a:srgbClr val="000000"/>
-                </a:solidFill>
-                <a:latin typeface="Lato"/>
-              </a:rPr>
-              <a:t>tela</a:t>
-            </a:r>
-            <a:r>
-              <a:rPr lang="en-US" sz="4000" spc="320" dirty="0">
-                <a:solidFill>
-                  <a:srgbClr val="000000"/>
-                </a:solidFill>
-                <a:latin typeface="Lato"/>
-              </a:rPr>
-              <a:t> com a </a:t>
-            </a:r>
-            <a:r>
-              <a:rPr lang="en-US" sz="4000" spc="320" err="1">
-                <a:solidFill>
-                  <a:srgbClr val="000000"/>
-                </a:solidFill>
-                <a:latin typeface="Lato"/>
-              </a:rPr>
-              <a:t>imagem</a:t>
-            </a:r>
-            <a:r>
-              <a:rPr lang="en-US" sz="4000" spc="320" dirty="0">
-                <a:solidFill>
-                  <a:srgbClr val="000000"/>
-                </a:solidFill>
-                <a:latin typeface="Lato"/>
-              </a:rPr>
-              <a:t> </a:t>
-            </a:r>
-            <a:r>
-              <a:rPr lang="en-US" sz="4000" spc="320" err="1">
-                <a:solidFill>
-                  <a:srgbClr val="000000"/>
-                </a:solidFill>
-                <a:latin typeface="Lato"/>
-              </a:rPr>
-              <a:t>em</a:t>
-            </a:r>
-            <a:r>
-              <a:rPr lang="en-US" sz="4000" spc="320" dirty="0">
-                <a:solidFill>
-                  <a:srgbClr val="000000"/>
-                </a:solidFill>
-                <a:latin typeface="Lato"/>
-              </a:rPr>
-              <a:t> </a:t>
-            </a:r>
-            <a:r>
-              <a:rPr lang="en-US" sz="4000" spc="320" err="1">
-                <a:solidFill>
-                  <a:srgbClr val="000000"/>
-                </a:solidFill>
-                <a:latin typeface="Lato"/>
-              </a:rPr>
-              <a:t>tamanho</a:t>
-            </a:r>
-            <a:r>
-              <a:rPr lang="en-US" sz="4000" spc="320" dirty="0">
-                <a:solidFill>
-                  <a:srgbClr val="000000"/>
-                </a:solidFill>
-                <a:latin typeface="Lato"/>
-              </a:rPr>
-              <a:t> real para o </a:t>
-            </a:r>
-            <a:r>
-              <a:rPr lang="en-US" sz="4000" spc="320" err="1">
-                <a:solidFill>
-                  <a:srgbClr val="000000"/>
-                </a:solidFill>
-                <a:latin typeface="Lato"/>
-              </a:rPr>
-              <a:t>usuário</a:t>
-            </a:r>
-            <a:r>
-              <a:rPr lang="en-US" sz="4000" spc="320" dirty="0">
-                <a:solidFill>
-                  <a:srgbClr val="000000"/>
-                </a:solidFill>
-                <a:latin typeface="Lato"/>
-              </a:rPr>
-              <a:t>.</a:t>
-            </a:r>
-            <a:endParaRPr lang="en-US" sz="4000" spc="320" dirty="0">
-              <a:solidFill>
-                <a:srgbClr val="000000"/>
-              </a:solidFill>
-              <a:latin typeface="Lato"/>
-              <a:ea typeface="Lato"/>
-              <a:cs typeface="Lato"/>
-            </a:endParaRPr>
-          </a:p>
-        </p:txBody>
-      </p:sp>
-      <p:sp>
-        <p:nvSpPr>
-          <p:cNvPr id="7" name="TextBox 7"/>
-          <p:cNvSpPr txBox="1"/>
-          <p:nvPr/>
-        </p:nvSpPr>
-        <p:spPr>
-          <a:xfrm>
-            <a:off x="9520673" y="7780484"/>
-            <a:ext cx="8767327" cy="1346522"/>
-          </a:xfrm>
-          <a:prstGeom prst="rect">
-            <a:avLst/>
-          </a:prstGeom>
-        </p:spPr>
-        <p:txBody>
-          <a:bodyPr lIns="0" tIns="0" rIns="0" bIns="0" rtlCol="0" anchor="t">
-            <a:spAutoFit/>
-          </a:bodyPr>
-          <a:lstStyle/>
-          <a:p>
-            <a:pPr algn="ctr">
-              <a:lnSpc>
-                <a:spcPts val="3499"/>
-              </a:lnSpc>
-            </a:pPr>
-            <a:r>
-              <a:rPr lang="en-US" sz="2300" spc="249" dirty="0" err="1">
-                <a:solidFill>
-                  <a:srgbClr val="000000"/>
-                </a:solidFill>
-                <a:latin typeface="Lato"/>
-              </a:rPr>
-              <a:t>Figura</a:t>
-            </a:r>
-            <a:r>
-              <a:rPr lang="en-US" sz="2300" spc="249" dirty="0">
-                <a:solidFill>
-                  <a:srgbClr val="000000"/>
-                </a:solidFill>
-                <a:latin typeface="Lato"/>
-              </a:rPr>
-              <a:t> 02 - Stateless </a:t>
-            </a:r>
-            <a:r>
-              <a:rPr lang="en-US" sz="2300" spc="249" dirty="0" err="1">
-                <a:solidFill>
-                  <a:srgbClr val="000000"/>
-                </a:solidFill>
-                <a:latin typeface="Lato"/>
-              </a:rPr>
-              <a:t>Wiget</a:t>
-            </a:r>
-            <a:endParaRPr lang="en-US" sz="2300" spc="249" dirty="0">
-              <a:solidFill>
-                <a:srgbClr val="000000"/>
-              </a:solidFill>
-              <a:latin typeface="Lato"/>
-            </a:endParaRPr>
-          </a:p>
-          <a:p>
-            <a:pPr algn="ctr">
-              <a:lnSpc>
-                <a:spcPts val="3499"/>
-              </a:lnSpc>
-              <a:spcBef>
-                <a:spcPct val="0"/>
-              </a:spcBef>
-            </a:pPr>
-            <a:r>
-              <a:rPr lang="en-US" sz="2300" spc="249" dirty="0" err="1">
-                <a:solidFill>
-                  <a:srgbClr val="000000"/>
-                </a:solidFill>
-                <a:latin typeface="Lato"/>
-              </a:rPr>
-              <a:t>Fonte</a:t>
-            </a:r>
-            <a:r>
-              <a:rPr lang="en-US" sz="2300" spc="249" dirty="0">
-                <a:solidFill>
-                  <a:srgbClr val="000000"/>
-                </a:solidFill>
-                <a:latin typeface="Lato"/>
-              </a:rPr>
-              <a:t>: </a:t>
-            </a:r>
-            <a:r>
-              <a:rPr lang="en-US" spc="249" dirty="0">
-                <a:solidFill>
-                  <a:srgbClr val="000000"/>
-                </a:solidFill>
-                <a:latin typeface="Lato"/>
-                <a:hlinkClick r:id="rId3"/>
-              </a:rPr>
-              <a:t>https://medium.com/tableless/entendendo-os-tipos-de-widgets-do-flutter-de9bb9296bf6</a:t>
-            </a:r>
-            <a:r>
-              <a:rPr lang="en-US" spc="249" dirty="0">
-                <a:solidFill>
-                  <a:srgbClr val="000000"/>
-                </a:solidFill>
-                <a:latin typeface="Lato"/>
+                <a:ea typeface="Lato"/>
+                <a:cs typeface="Lato"/>
+              </a:rPr>
+              <a:t>processo</a:t>
+            </a:r>
+            <a:r>
+              <a:rPr lang="en-US" sz="4000" spc="320" dirty="0">
+                <a:solidFill>
+                  <a:srgbClr val="000000"/>
+                </a:solidFill>
+                <a:latin typeface="Lato"/>
+                <a:ea typeface="Lato"/>
+                <a:cs typeface="Lato"/>
               </a:rPr>
               <a:t>.</a:t>
             </a:r>
@@ -10024,7 +10089,7 @@
         <p:spPr>
           <a:xfrm>
             <a:off x="563276" y="1569289"/>
-            <a:ext cx="17161448" cy="3462486"/>
+            <a:ext cx="17161448" cy="6529544"/>
           </a:xfrm>
           <a:prstGeom prst="rect">
             <a:avLst/>
@@ -10102,25 +10167,7 @@
                 </a:solidFill>
                 <a:latin typeface="Lato Bold"/>
               </a:rPr>
-              <a:t> de Widgets do Flutter - </a:t>
-            </a:r>
-            <a:r>
-              <a:rPr lang="en-US" sz="3200" spc="320" dirty="0" err="1">
-                <a:solidFill>
-                  <a:srgbClr val="000000"/>
-                </a:solidFill>
-                <a:latin typeface="Lato Bold"/>
-              </a:rPr>
-              <a:t>Tableless</a:t>
-            </a:r>
-            <a:r>
-              <a:rPr lang="en-US" sz="3200" spc="320" dirty="0">
-                <a:solidFill>
-                  <a:srgbClr val="000000"/>
-                </a:solidFill>
-                <a:latin typeface="Lato Bold"/>
-              </a:rPr>
-              <a:t> - Medium.</a:t>
+              <a:t> de Widgets do Flutter - Tableless - Medium.</a:t>
             </a:r>
             <a:r>
               <a:rPr lang="en-US" sz="3200" spc="320" dirty="0">
@@ -10351,6 +10398,221 @@
               </a:rPr>
               <a:t>: 7 mar. 2024.</a:t>
             </a:r>
+          </a:p>
+          <a:p>
+            <a:pPr algn="just">
+              <a:lnSpc>
+                <a:spcPts val="4480"/>
+              </a:lnSpc>
+            </a:pPr>
+            <a:endParaRPr lang="en-US" sz="3200" spc="320" dirty="0">
+              <a:solidFill>
+                <a:srgbClr val="000000"/>
+              </a:solidFill>
+              <a:latin typeface="Lato"/>
+              <a:ea typeface="Lato"/>
+              <a:cs typeface="Lato"/>
+            </a:endParaRPr>
+          </a:p>
+          <a:p>
+            <a:pPr algn="just"/>
+            <a:r>
+              <a:rPr lang="en-US" sz="3200" b="1" spc="320" dirty="0">
+                <a:solidFill>
+                  <a:srgbClr val="000000"/>
+                </a:solidFill>
+                <a:latin typeface="Lato"/>
+                <a:ea typeface="Lato"/>
+                <a:cs typeface="Lato"/>
+              </a:rPr>
+              <a:t>Flutter - Qual é a </a:t>
+            </a:r>
+            <a:r>
+              <a:rPr lang="en-US" sz="3200" b="1" spc="320" err="1">
+                <a:solidFill>
+                  <a:srgbClr val="000000"/>
+                </a:solidFill>
+                <a:latin typeface="Lato"/>
+                <a:ea typeface="Lato"/>
+                <a:cs typeface="Lato"/>
+              </a:rPr>
+              <a:t>diferença</a:t>
+            </a:r>
+            <a:r>
+              <a:rPr lang="en-US" sz="3200" b="1" spc="320" dirty="0">
+                <a:solidFill>
+                  <a:srgbClr val="000000"/>
+                </a:solidFill>
+                <a:latin typeface="Lato"/>
+                <a:ea typeface="Lato"/>
+                <a:cs typeface="Lato"/>
+              </a:rPr>
+              <a:t> entre stateless e stateful widget?</a:t>
+            </a:r>
+            <a:r>
+              <a:rPr lang="en-US" sz="3200" spc="320" dirty="0">
+                <a:solidFill>
+                  <a:srgbClr val="000000"/>
+                </a:solidFill>
+                <a:latin typeface="Lato"/>
+                <a:ea typeface="Lato"/>
+                <a:cs typeface="Lato"/>
+              </a:rPr>
+              <a:t> </a:t>
+            </a:r>
+            <a:r>
+              <a:rPr lang="en-US" sz="3200" spc="320" err="1">
+                <a:solidFill>
+                  <a:srgbClr val="000000"/>
+                </a:solidFill>
+                <a:latin typeface="Lato"/>
+                <a:ea typeface="Lato"/>
+                <a:cs typeface="Lato"/>
+              </a:rPr>
+              <a:t>Disponível</a:t>
+            </a:r>
+            <a:r>
+              <a:rPr lang="en-US" sz="3200" spc="320" dirty="0">
+                <a:solidFill>
+                  <a:srgbClr val="000000"/>
+                </a:solidFill>
+                <a:latin typeface="Lato"/>
+                <a:ea typeface="Lato"/>
+                <a:cs typeface="Lato"/>
+              </a:rPr>
+              <a:t> </a:t>
+            </a:r>
+            <a:r>
+              <a:rPr lang="en-US" sz="3200" spc="320" err="1">
+                <a:solidFill>
+                  <a:srgbClr val="000000"/>
+                </a:solidFill>
+                <a:latin typeface="Lato"/>
+                <a:ea typeface="Lato"/>
+                <a:cs typeface="Lato"/>
+              </a:rPr>
+              <a:t>em</a:t>
+            </a:r>
+            <a:r>
+              <a:rPr lang="en-US" sz="3200" spc="320" dirty="0">
+                <a:solidFill>
+                  <a:srgbClr val="000000"/>
+                </a:solidFill>
+                <a:latin typeface="Lato"/>
+                <a:ea typeface="Lato"/>
+                <a:cs typeface="Lato"/>
+              </a:rPr>
+              <a:t>: </a:t>
+            </a:r>
+            <a:r>
+              <a:rPr lang="en-US" sz="3200" spc="320" dirty="0">
+                <a:solidFill>
+                  <a:srgbClr val="000000"/>
+                </a:solidFill>
+                <a:latin typeface="Lato"/>
+                <a:ea typeface="Lato"/>
+                <a:cs typeface="Lato"/>
+                <a:hlinkClick r:id="rId4"/>
+              </a:rPr>
+              <a:t>https://www.alura.com.br/artigos/flutter-diferenca-entre-stateless-e-statefull-widget?srsltid=AfmBOoqyVyRioiehY0zWnqaOKrhargalxfO2SdcxuFch-11ViCIzf91v</a:t>
+            </a:r>
+            <a:r>
+              <a:rPr lang="en-US" sz="3200" spc="320" dirty="0">
+                <a:solidFill>
+                  <a:srgbClr val="000000"/>
+                </a:solidFill>
+                <a:latin typeface="Lato"/>
+                <a:ea typeface="Lato"/>
+                <a:cs typeface="Lato"/>
+              </a:rPr>
+              <a:t>. </a:t>
+            </a:r>
+            <a:r>
+              <a:rPr lang="en-US" sz="3200" spc="320" err="1">
+                <a:solidFill>
+                  <a:srgbClr val="000000"/>
+                </a:solidFill>
+                <a:latin typeface="Lato"/>
+                <a:ea typeface="Lato"/>
+                <a:cs typeface="Lato"/>
+              </a:rPr>
+              <a:t>Acesso</a:t>
+            </a:r>
+            <a:r>
+              <a:rPr lang="en-US" sz="3200" spc="320" dirty="0">
+                <a:solidFill>
+                  <a:srgbClr val="000000"/>
+                </a:solidFill>
+                <a:latin typeface="Lato"/>
+                <a:ea typeface="Lato"/>
+                <a:cs typeface="Lato"/>
+              </a:rPr>
+              <a:t> </a:t>
+            </a:r>
+            <a:r>
+              <a:rPr lang="en-US" sz="3200" spc="320" err="1">
+                <a:solidFill>
+                  <a:srgbClr val="000000"/>
+                </a:solidFill>
+                <a:latin typeface="Lato"/>
+                <a:ea typeface="Lato"/>
+                <a:cs typeface="Lato"/>
+              </a:rPr>
+              <a:t>em</a:t>
+            </a:r>
+            <a:r>
+              <a:rPr lang="en-US" sz="3200" spc="320" dirty="0">
+                <a:solidFill>
+                  <a:srgbClr val="000000"/>
+                </a:solidFill>
+                <a:latin typeface="Lato"/>
+                <a:ea typeface="Lato"/>
+                <a:cs typeface="Lato"/>
+              </a:rPr>
+              <a:t>: 8 </a:t>
+            </a:r>
+            <a:r>
+              <a:rPr lang="en-US" sz="3200" spc="320" err="1">
+                <a:solidFill>
+                  <a:srgbClr val="000000"/>
+                </a:solidFill>
+                <a:latin typeface="Lato"/>
+                <a:ea typeface="Lato"/>
+                <a:cs typeface="Lato"/>
+              </a:rPr>
+              <a:t>dez</a:t>
+            </a:r>
+            <a:r>
+              <a:rPr lang="en-US" sz="3200" spc="320" dirty="0">
+                <a:solidFill>
+                  <a:srgbClr val="000000"/>
+                </a:solidFill>
+                <a:latin typeface="Lato"/>
+                <a:ea typeface="Lato"/>
+                <a:cs typeface="Lato"/>
+              </a:rPr>
+              <a:t>. 2024.</a:t>
+            </a:r>
+            <a:endParaRPr lang="en-US" dirty="0">
+              <a:latin typeface="Calibri"/>
+              <a:ea typeface="Calibri"/>
+              <a:cs typeface="Calibri"/>
+            </a:endParaRPr>
+          </a:p>
+          <a:p>
+            <a:pPr algn="just">
+              <a:lnSpc>
+                <a:spcPts val="4480"/>
+              </a:lnSpc>
+            </a:pPr>
+            <a:endParaRPr lang="en-US" sz="3200" spc="320" dirty="0">
+              <a:solidFill>
+                <a:srgbClr val="000000"/>
+              </a:solidFill>
+              <a:latin typeface="Lato"/>
+              <a:ea typeface="Lato"/>
+              <a:cs typeface="Lato"/>
+            </a:endParaRPr>
           </a:p>
         </p:txBody>
       </p:sp>

</xml_diff>